<commit_message>
Inclusão dos Slides 8 e 9 á versão do projeto.
</commit_message>
<xml_diff>
--- a/Projeto Eco-Energy 21.pptx
+++ b/Projeto Eco-Energy 21.pptx
@@ -5,7 +5,7 @@
     <p:sldMasterId id="2147483695" r:id="rId1"/>
   </p:sldMasterIdLst>
   <p:notesMasterIdLst>
-    <p:notesMasterId r:id="rId12"/>
+    <p:notesMasterId r:id="rId14"/>
   </p:notesMasterIdLst>
   <p:sldIdLst>
     <p:sldId id="256" r:id="rId2"/>
@@ -15,9 +15,11 @@
     <p:sldId id="269" r:id="rId6"/>
     <p:sldId id="270" r:id="rId7"/>
     <p:sldId id="264" r:id="rId8"/>
-    <p:sldId id="258" r:id="rId9"/>
-    <p:sldId id="266" r:id="rId10"/>
-    <p:sldId id="265" r:id="rId11"/>
+    <p:sldId id="272" r:id="rId9"/>
+    <p:sldId id="273" r:id="rId10"/>
+    <p:sldId id="258" r:id="rId11"/>
+    <p:sldId id="266" r:id="rId12"/>
+    <p:sldId id="265" r:id="rId13"/>
   </p:sldIdLst>
   <p:sldSz cx="12192000" cy="6858000"/>
   <p:notesSz cx="6858000" cy="9144000"/>
@@ -132,6 +134,8 @@
             <p14:sldId id="269"/>
             <p14:sldId id="270"/>
             <p14:sldId id="264"/>
+            <p14:sldId id="272"/>
+            <p14:sldId id="273"/>
             <p14:sldId id="258"/>
             <p14:sldId id="266"/>
             <p14:sldId id="265"/>
@@ -3946,6 +3950,679 @@
       </p:grpSpPr>
       <p:sp>
         <p:nvSpPr>
+          <p:cNvPr id="5" name="CaixaDeTexto 4">
+            <a:extLst>
+              <a:ext uri="{FF2B5EF4-FFF2-40B4-BE49-F238E27FC236}">
+                <a16:creationId xmlns:a16="http://schemas.microsoft.com/office/drawing/2014/main" id="{CF3707E6-01AE-4D6B-B71D-116C66A72B64}"/>
+              </a:ext>
+            </a:extLst>
+          </p:cNvPr>
+          <p:cNvSpPr txBox="1"/>
+          <p:nvPr/>
+        </p:nvSpPr>
+        <p:spPr>
+          <a:xfrm>
+            <a:off x="411687" y="1358404"/>
+            <a:ext cx="5313542" cy="5363071"/>
+          </a:xfrm>
+          <a:prstGeom prst="rect">
+            <a:avLst/>
+          </a:prstGeom>
+          <a:noFill/>
+        </p:spPr>
+        <p:txBody>
+          <a:bodyPr wrap="square">
+            <a:spAutoFit/>
+          </a:bodyPr>
+          <a:lstStyle/>
+          <a:p>
+            <a:pPr algn="l"/>
+            <a:r>
+              <a:rPr lang="pt-BR" sz="1400" b="1" i="0" dirty="0">
+                <a:solidFill>
+                  <a:srgbClr val="000000"/>
+                </a:solidFill>
+                <a:effectLst/>
+                <a:latin typeface="Montserrat" panose="00000500000000000000" pitchFamily="2" charset="0"/>
+              </a:rPr>
+              <a:t>Energia solar em Minas</a:t>
+            </a:r>
+          </a:p>
+          <a:p>
+            <a:pPr algn="l"/>
+            <a:r>
+              <a:rPr lang="pt-BR" sz="1400" b="0" i="0" dirty="0">
+                <a:solidFill>
+                  <a:srgbClr val="706F6F"/>
+                </a:solidFill>
+                <a:effectLst/>
+                <a:latin typeface="Lato" panose="020F0502020204030203" pitchFamily="34" charset="0"/>
+              </a:rPr>
+              <a:t>Cemig precisa acompanhar demanda pela nova energia gerada em fazenda solares e por pequenos geradores.</a:t>
+            </a:r>
+          </a:p>
+          <a:p>
+            <a:pPr algn="l"/>
+            <a:r>
+              <a:rPr lang="pt-BR" sz="1400" b="0" i="0" dirty="0">
+                <a:solidFill>
+                  <a:srgbClr val="353434"/>
+                </a:solidFill>
+                <a:effectLst/>
+                <a:latin typeface="CharterBT-Roman"/>
+              </a:rPr>
+              <a:t>Cresce em Minas a procura por áreas de grande insolação, próprias para a instalação das chamadas fazendas solares. Falta que a Cemig acelere a construção de linhas de transmissão e de subestações, essenciais para o aproveitamento, através da transferência da energia gerada. A energia solar tem o mais econômico custo de instalação por quilowatt gerado. É um investimento que dura 25 anos, gera milhares de empregos e tem seu aproveitamento muito mais barato do que as demais formas de oferta de energia. Se a Cemig fosse mais eficiente nessa percepção, vários problemas de Minas, nessa demanda da energia poderiam estar resolvidos de maneira melhor, com repercussões sociais mais eficazes. Sobretudo na geração de empregos, renda e na fixação de pessoas nas suas regiões de origem. </a:t>
+            </a:r>
+            <a:endParaRPr lang="pt-BR" sz="1400" b="0" i="0" dirty="0">
+              <a:solidFill>
+                <a:srgbClr val="706F6F"/>
+              </a:solidFill>
+              <a:effectLst/>
+              <a:latin typeface="Lato" panose="020F0502020204030203" pitchFamily="34" charset="0"/>
+            </a:endParaRPr>
+          </a:p>
+          <a:p>
+            <a:pPr algn="just">
+              <a:lnSpc>
+                <a:spcPct val="107000"/>
+              </a:lnSpc>
+              <a:spcAft>
+                <a:spcPts val="800"/>
+              </a:spcAft>
+            </a:pPr>
+            <a:endParaRPr lang="pt-BR" sz="1400" dirty="0">
+              <a:solidFill>
+                <a:srgbClr val="FF0000"/>
+              </a:solidFill>
+              <a:effectLst/>
+              <a:ea typeface="Times New Roman" panose="02020603050405020304" pitchFamily="18" charset="0"/>
+              <a:cs typeface="Times New Roman" panose="02020603050405020304" pitchFamily="18" charset="0"/>
+            </a:endParaRPr>
+          </a:p>
+          <a:p>
+            <a:pPr algn="just">
+              <a:lnSpc>
+                <a:spcPct val="107000"/>
+              </a:lnSpc>
+              <a:spcAft>
+                <a:spcPts val="800"/>
+              </a:spcAft>
+            </a:pPr>
+            <a:r>
+              <a:rPr lang="pt-BR" sz="1400" dirty="0">
+                <a:solidFill>
+                  <a:srgbClr val="FF0000"/>
+                </a:solidFill>
+                <a:effectLst/>
+                <a:ea typeface="Times New Roman" panose="02020603050405020304" pitchFamily="18" charset="0"/>
+                <a:cs typeface="Times New Roman" panose="02020603050405020304" pitchFamily="18" charset="0"/>
+              </a:rPr>
+              <a:t>As pequenas empresas produtoras de energia fotovoltaica irão fornecer serviços para a população e até mesmo outras instituições, afim de diminuir o valor gasto em energias de alto custo, visto que o custo da energia solar para o consumidor final é bem menor. Além disso, diminuir os impactos ambientais e ecológicos que as usinas hidrelétricas causam.</a:t>
+            </a:r>
+          </a:p>
+          <a:p>
+            <a:pPr algn="just">
+              <a:lnSpc>
+                <a:spcPct val="107000"/>
+              </a:lnSpc>
+              <a:spcAft>
+                <a:spcPts val="800"/>
+              </a:spcAft>
+            </a:pPr>
+            <a:r>
+              <a:rPr lang="pt-BR" sz="1400" dirty="0">
+                <a:solidFill>
+                  <a:srgbClr val="FF0000"/>
+                </a:solidFill>
+                <a:ea typeface="Calibri" panose="020F0502020204030204" pitchFamily="34" charset="0"/>
+                <a:cs typeface="Times New Roman" panose="02020603050405020304" pitchFamily="18" charset="0"/>
+              </a:rPr>
+              <a:t>(Também não entendi)</a:t>
+            </a:r>
+            <a:endParaRPr lang="pt-BR" sz="1400" dirty="0">
+              <a:solidFill>
+                <a:srgbClr val="FF0000"/>
+              </a:solidFill>
+              <a:effectLst/>
+              <a:ea typeface="Calibri" panose="020F0502020204030204" pitchFamily="34" charset="0"/>
+              <a:cs typeface="Times New Roman" panose="02020603050405020304" pitchFamily="18" charset="0"/>
+            </a:endParaRPr>
+          </a:p>
+        </p:txBody>
+      </p:sp>
+      <p:sp>
+        <p:nvSpPr>
+          <p:cNvPr id="6" name="Espaço Reservado para Rodapé 5">
+            <a:extLst>
+              <a:ext uri="{FF2B5EF4-FFF2-40B4-BE49-F238E27FC236}">
+                <a16:creationId xmlns:a16="http://schemas.microsoft.com/office/drawing/2014/main" id="{88955371-7B1B-4F45-8E0F-2D8778641381}"/>
+              </a:ext>
+            </a:extLst>
+          </p:cNvPr>
+          <p:cNvSpPr>
+            <a:spLocks noGrp="1"/>
+          </p:cNvSpPr>
+          <p:nvPr>
+            <p:ph type="ftr" sz="quarter" idx="11"/>
+          </p:nvPr>
+        </p:nvSpPr>
+        <p:spPr/>
+        <p:txBody>
+          <a:bodyPr/>
+          <a:lstStyle/>
+          <a:p>
+            <a:r>
+              <a:rPr lang="pt-BR" sz="1600" dirty="0">
+                <a:solidFill>
+                  <a:schemeClr val="tx1"/>
+                </a:solidFill>
+              </a:rPr>
+              <a:t>Grupo Eco Energy-21</a:t>
+            </a:r>
+          </a:p>
+        </p:txBody>
+      </p:sp>
+      <p:sp>
+        <p:nvSpPr>
+          <p:cNvPr id="8" name="Espaço Reservado para Número de Slide 7">
+            <a:extLst>
+              <a:ext uri="{FF2B5EF4-FFF2-40B4-BE49-F238E27FC236}">
+                <a16:creationId xmlns:a16="http://schemas.microsoft.com/office/drawing/2014/main" id="{273E7CE3-7453-4B12-99B7-327A5F637046}"/>
+              </a:ext>
+            </a:extLst>
+          </p:cNvPr>
+          <p:cNvSpPr>
+            <a:spLocks noGrp="1"/>
+          </p:cNvSpPr>
+          <p:nvPr>
+            <p:ph type="sldNum" sz="quarter" idx="12"/>
+          </p:nvPr>
+        </p:nvSpPr>
+        <p:spPr/>
+        <p:txBody>
+          <a:bodyPr/>
+          <a:lstStyle/>
+          <a:p>
+            <a:fld id="{24F432EC-2972-46C7-97C1-1EB75B8CBA8A}" type="slidenum">
+              <a:rPr lang="pt-BR" sz="2500" smtClean="0">
+                <a:solidFill>
+                  <a:schemeClr val="tx1"/>
+                </a:solidFill>
+              </a:rPr>
+              <a:t>10</a:t>
+            </a:fld>
+            <a:endParaRPr lang="pt-BR" sz="2500">
+              <a:solidFill>
+                <a:schemeClr val="tx1"/>
+              </a:solidFill>
+            </a:endParaRPr>
+          </a:p>
+        </p:txBody>
+      </p:sp>
+      <p:pic>
+        <p:nvPicPr>
+          <p:cNvPr id="2050" name="Picture 2" descr="Atividade Avaliativa 1 – Gestão de Projetos Empresariais – 5º Semestre 2019  – Gestão Empresarial FATEC">
+            <a:extLst>
+              <a:ext uri="{FF2B5EF4-FFF2-40B4-BE49-F238E27FC236}">
+                <a16:creationId xmlns:a16="http://schemas.microsoft.com/office/drawing/2014/main" id="{A09F79F5-CA4D-4AFC-B70F-10D281AC8AD1}"/>
+              </a:ext>
+            </a:extLst>
+          </p:cNvPr>
+          <p:cNvPicPr>
+            <a:picLocks noChangeAspect="1" noChangeArrowheads="1"/>
+          </p:cNvPicPr>
+          <p:nvPr/>
+        </p:nvPicPr>
+        <p:blipFill>
+          <a:blip r:embed="rId2">
+            <a:extLst>
+              <a:ext uri="{28A0092B-C50C-407E-A947-70E740481C1C}">
+                <a14:useLocalDpi xmlns:a14="http://schemas.microsoft.com/office/drawing/2010/main" val="0"/>
+              </a:ext>
+            </a:extLst>
+          </a:blip>
+          <a:srcRect/>
+          <a:stretch>
+            <a:fillRect/>
+          </a:stretch>
+        </p:blipFill>
+        <p:spPr bwMode="auto">
+          <a:xfrm>
+            <a:off x="6151223" y="1632670"/>
+            <a:ext cx="5274293" cy="2687538"/>
+          </a:xfrm>
+          <a:prstGeom prst="rect">
+            <a:avLst/>
+          </a:prstGeom>
+          <a:noFill/>
+          <a:extLst>
+            <a:ext uri="{909E8E84-426E-40DD-AFC4-6F175D3DCCD1}">
+              <a14:hiddenFill xmlns:a14="http://schemas.microsoft.com/office/drawing/2010/main">
+                <a:solidFill>
+                  <a:srgbClr val="FFFFFF"/>
+                </a:solidFill>
+              </a14:hiddenFill>
+            </a:ext>
+          </a:extLst>
+        </p:spPr>
+      </p:pic>
+      <p:sp>
+        <p:nvSpPr>
+          <p:cNvPr id="7" name="CaixaDeTexto 6">
+            <a:extLst>
+              <a:ext uri="{FF2B5EF4-FFF2-40B4-BE49-F238E27FC236}">
+                <a16:creationId xmlns:a16="http://schemas.microsoft.com/office/drawing/2014/main" id="{7597B04F-E324-4254-B89D-8EE5C80F19FA}"/>
+              </a:ext>
+            </a:extLst>
+          </p:cNvPr>
+          <p:cNvSpPr txBox="1"/>
+          <p:nvPr/>
+        </p:nvSpPr>
+        <p:spPr>
+          <a:xfrm>
+            <a:off x="1060175" y="270314"/>
+            <a:ext cx="10137912" cy="707886"/>
+          </a:xfrm>
+          <a:prstGeom prst="rect">
+            <a:avLst/>
+          </a:prstGeom>
+          <a:noFill/>
+        </p:spPr>
+        <p:txBody>
+          <a:bodyPr wrap="square">
+            <a:spAutoFit/>
+          </a:bodyPr>
+          <a:lstStyle/>
+          <a:p>
+            <a:pPr algn="ctr"/>
+            <a:r>
+              <a:rPr lang="en-US" sz="4000" b="1" dirty="0">
+                <a:latin typeface="Arial Black"/>
+                <a:sym typeface="Arial Black"/>
+              </a:rPr>
+              <a:t>HORIZONTE QUE SE APRESENTA</a:t>
+            </a:r>
+            <a:endParaRPr lang="pt-BR" sz="4000" dirty="0"/>
+          </a:p>
+        </p:txBody>
+      </p:sp>
+    </p:spTree>
+    <p:extLst>
+      <p:ext uri="{BB962C8B-B14F-4D97-AF65-F5344CB8AC3E}">
+        <p14:creationId xmlns:p14="http://schemas.microsoft.com/office/powerpoint/2010/main" val="779086811"/>
+      </p:ext>
+    </p:extLst>
+  </p:cSld>
+  <p:clrMapOvr>
+    <a:masterClrMapping/>
+  </p:clrMapOvr>
+</p:sld>
+</file>
+
+<file path=ppt/slides/slide11.xml><?xml version="1.0" encoding="utf-8"?>
+<p:sld xmlns:a="http://schemas.openxmlformats.org/drawingml/2006/main" xmlns:r="http://schemas.openxmlformats.org/officeDocument/2006/relationships" xmlns:p="http://schemas.openxmlformats.org/presentationml/2006/main">
+  <p:cSld>
+    <p:spTree>
+      <p:nvGrpSpPr>
+        <p:cNvPr id="1" name=""/>
+        <p:cNvGrpSpPr/>
+        <p:nvPr/>
+      </p:nvGrpSpPr>
+      <p:grpSpPr>
+        <a:xfrm>
+          <a:off x="0" y="0"/>
+          <a:ext cx="0" cy="0"/>
+          <a:chOff x="0" y="0"/>
+          <a:chExt cx="0" cy="0"/>
+        </a:xfrm>
+      </p:grpSpPr>
+      <p:sp>
+        <p:nvSpPr>
+          <p:cNvPr id="3" name="CaixaDeTexto 2">
+            <a:extLst>
+              <a:ext uri="{FF2B5EF4-FFF2-40B4-BE49-F238E27FC236}">
+                <a16:creationId xmlns:a16="http://schemas.microsoft.com/office/drawing/2014/main" id="{C4E4B2FD-EA94-46F9-8957-15BE8504D9BB}"/>
+              </a:ext>
+            </a:extLst>
+          </p:cNvPr>
+          <p:cNvSpPr txBox="1"/>
+          <p:nvPr/>
+        </p:nvSpPr>
+        <p:spPr>
+          <a:xfrm>
+            <a:off x="2394012" y="270314"/>
+            <a:ext cx="7726532" cy="769441"/>
+          </a:xfrm>
+          <a:prstGeom prst="rect">
+            <a:avLst/>
+          </a:prstGeom>
+          <a:noFill/>
+        </p:spPr>
+        <p:txBody>
+          <a:bodyPr wrap="square">
+            <a:spAutoFit/>
+          </a:bodyPr>
+          <a:lstStyle/>
+          <a:p>
+            <a:pPr algn="ctr"/>
+            <a:r>
+              <a:rPr lang="en-US" sz="4400" b="1" dirty="0">
+                <a:latin typeface="Arial Black"/>
+                <a:sym typeface="Arial Black"/>
+              </a:rPr>
+              <a:t>PROJETO</a:t>
+            </a:r>
+            <a:endParaRPr lang="pt-BR" sz="4400" dirty="0"/>
+          </a:p>
+        </p:txBody>
+      </p:sp>
+      <p:sp>
+        <p:nvSpPr>
+          <p:cNvPr id="5" name="CaixaDeTexto 4">
+            <a:extLst>
+              <a:ext uri="{FF2B5EF4-FFF2-40B4-BE49-F238E27FC236}">
+                <a16:creationId xmlns:a16="http://schemas.microsoft.com/office/drawing/2014/main" id="{CF3707E6-01AE-4D6B-B71D-116C66A72B64}"/>
+              </a:ext>
+            </a:extLst>
+          </p:cNvPr>
+          <p:cNvSpPr txBox="1"/>
+          <p:nvPr/>
+        </p:nvSpPr>
+        <p:spPr>
+          <a:xfrm>
+            <a:off x="361326" y="2312772"/>
+            <a:ext cx="5313542" cy="3336811"/>
+          </a:xfrm>
+          <a:prstGeom prst="rect">
+            <a:avLst/>
+          </a:prstGeom>
+          <a:noFill/>
+        </p:spPr>
+        <p:txBody>
+          <a:bodyPr wrap="square">
+            <a:spAutoFit/>
+          </a:bodyPr>
+          <a:lstStyle/>
+          <a:p>
+            <a:pPr algn="just">
+              <a:lnSpc>
+                <a:spcPct val="107000"/>
+              </a:lnSpc>
+              <a:spcAft>
+                <a:spcPts val="800"/>
+              </a:spcAft>
+            </a:pPr>
+            <a:r>
+              <a:rPr lang="pt-BR" sz="2200" dirty="0">
+                <a:solidFill>
+                  <a:srgbClr val="212529"/>
+                </a:solidFill>
+                <a:effectLst/>
+                <a:ea typeface="Times New Roman" panose="02020603050405020304" pitchFamily="18" charset="0"/>
+                <a:cs typeface="Times New Roman" panose="02020603050405020304" pitchFamily="18" charset="0"/>
+              </a:rPr>
+              <a:t>O projeto, teria a colaboração de vários produtores de energia fotovoltaica, também seria adicionado um incentivo governamental para proporcionar o crescimento na área. O projeto ainda contará com um sistema de software que terá como finalidade o monitoramento e análise das placas solares, esse seria gerido por uma empresa parceira do projeto.</a:t>
+            </a:r>
+            <a:endParaRPr lang="pt-BR" sz="2200" dirty="0">
+              <a:effectLst/>
+              <a:ea typeface="Calibri" panose="020F0502020204030204" pitchFamily="34" charset="0"/>
+              <a:cs typeface="Times New Roman" panose="02020603050405020304" pitchFamily="18" charset="0"/>
+            </a:endParaRPr>
+          </a:p>
+        </p:txBody>
+      </p:sp>
+      <p:sp>
+        <p:nvSpPr>
+          <p:cNvPr id="6" name="Espaço Reservado para Rodapé 5">
+            <a:extLst>
+              <a:ext uri="{FF2B5EF4-FFF2-40B4-BE49-F238E27FC236}">
+                <a16:creationId xmlns:a16="http://schemas.microsoft.com/office/drawing/2014/main" id="{88955371-7B1B-4F45-8E0F-2D8778641381}"/>
+              </a:ext>
+            </a:extLst>
+          </p:cNvPr>
+          <p:cNvSpPr>
+            <a:spLocks noGrp="1"/>
+          </p:cNvSpPr>
+          <p:nvPr>
+            <p:ph type="ftr" sz="quarter" idx="11"/>
+          </p:nvPr>
+        </p:nvSpPr>
+        <p:spPr/>
+        <p:txBody>
+          <a:bodyPr/>
+          <a:lstStyle/>
+          <a:p>
+            <a:r>
+              <a:rPr lang="pt-BR" sz="1600" dirty="0">
+                <a:solidFill>
+                  <a:schemeClr val="tx1"/>
+                </a:solidFill>
+              </a:rPr>
+              <a:t>Grupo Eco Energy-21</a:t>
+            </a:r>
+          </a:p>
+        </p:txBody>
+      </p:sp>
+      <p:sp>
+        <p:nvSpPr>
+          <p:cNvPr id="8" name="Espaço Reservado para Número de Slide 7">
+            <a:extLst>
+              <a:ext uri="{FF2B5EF4-FFF2-40B4-BE49-F238E27FC236}">
+                <a16:creationId xmlns:a16="http://schemas.microsoft.com/office/drawing/2014/main" id="{273E7CE3-7453-4B12-99B7-327A5F637046}"/>
+              </a:ext>
+            </a:extLst>
+          </p:cNvPr>
+          <p:cNvSpPr>
+            <a:spLocks noGrp="1"/>
+          </p:cNvSpPr>
+          <p:nvPr>
+            <p:ph type="sldNum" sz="quarter" idx="12"/>
+          </p:nvPr>
+        </p:nvSpPr>
+        <p:spPr/>
+        <p:txBody>
+          <a:bodyPr/>
+          <a:lstStyle/>
+          <a:p>
+            <a:fld id="{24F432EC-2972-46C7-97C1-1EB75B8CBA8A}" type="slidenum">
+              <a:rPr lang="pt-BR" sz="2500" smtClean="0">
+                <a:solidFill>
+                  <a:schemeClr val="tx1"/>
+                </a:solidFill>
+              </a:rPr>
+              <a:t>11</a:t>
+            </a:fld>
+            <a:endParaRPr lang="pt-BR" sz="2500">
+              <a:solidFill>
+                <a:schemeClr val="tx1"/>
+              </a:solidFill>
+            </a:endParaRPr>
+          </a:p>
+        </p:txBody>
+      </p:sp>
+      <p:pic>
+        <p:nvPicPr>
+          <p:cNvPr id="3074" name="Picture 2" descr="Você sabe como funcionam as parcerias entre empresas?">
+            <a:extLst>
+              <a:ext uri="{FF2B5EF4-FFF2-40B4-BE49-F238E27FC236}">
+                <a16:creationId xmlns:a16="http://schemas.microsoft.com/office/drawing/2014/main" id="{97A6FE06-8228-49DE-9AE4-06CCDC54C135}"/>
+              </a:ext>
+            </a:extLst>
+          </p:cNvPr>
+          <p:cNvPicPr>
+            <a:picLocks noChangeAspect="1" noChangeArrowheads="1"/>
+          </p:cNvPicPr>
+          <p:nvPr/>
+        </p:nvPicPr>
+        <p:blipFill>
+          <a:blip r:embed="rId2">
+            <a:extLst>
+              <a:ext uri="{28A0092B-C50C-407E-A947-70E740481C1C}">
+                <a14:useLocalDpi xmlns:a14="http://schemas.microsoft.com/office/drawing/2010/main" val="0"/>
+              </a:ext>
+            </a:extLst>
+          </a:blip>
+          <a:srcRect/>
+          <a:stretch>
+            <a:fillRect/>
+          </a:stretch>
+        </p:blipFill>
+        <p:spPr bwMode="auto">
+          <a:xfrm>
+            <a:off x="6279356" y="1464585"/>
+            <a:ext cx="4662487" cy="3102673"/>
+          </a:xfrm>
+          <a:prstGeom prst="rect">
+            <a:avLst/>
+          </a:prstGeom>
+          <a:noFill/>
+          <a:extLst>
+            <a:ext uri="{909E8E84-426E-40DD-AFC4-6F175D3DCCD1}">
+              <a14:hiddenFill xmlns:a14="http://schemas.microsoft.com/office/drawing/2010/main">
+                <a:solidFill>
+                  <a:srgbClr val="FFFFFF"/>
+                </a:solidFill>
+              </a14:hiddenFill>
+            </a:ext>
+          </a:extLst>
+        </p:spPr>
+      </p:pic>
+      <p:sp>
+        <p:nvSpPr>
+          <p:cNvPr id="7" name="CaixaDeTexto 6">
+            <a:extLst>
+              <a:ext uri="{FF2B5EF4-FFF2-40B4-BE49-F238E27FC236}">
+                <a16:creationId xmlns:a16="http://schemas.microsoft.com/office/drawing/2014/main" id="{0499B026-AC6A-4C50-91D3-FE842932019A}"/>
+              </a:ext>
+            </a:extLst>
+          </p:cNvPr>
+          <p:cNvSpPr txBox="1"/>
+          <p:nvPr/>
+        </p:nvSpPr>
+        <p:spPr>
+          <a:xfrm>
+            <a:off x="398738" y="5686394"/>
+            <a:ext cx="6098344" cy="369332"/>
+          </a:xfrm>
+          <a:prstGeom prst="rect">
+            <a:avLst/>
+          </a:prstGeom>
+          <a:noFill/>
+        </p:spPr>
+        <p:txBody>
+          <a:bodyPr wrap="square">
+            <a:spAutoFit/>
+          </a:bodyPr>
+          <a:lstStyle/>
+          <a:p>
+            <a:r>
+              <a:rPr lang="pt-BR" sz="1800" dirty="0">
+                <a:solidFill>
+                  <a:srgbClr val="FF0000"/>
+                </a:solidFill>
+                <a:ea typeface="Calibri" panose="020F0502020204030204" pitchFamily="34" charset="0"/>
+                <a:cs typeface="Times New Roman" panose="02020603050405020304" pitchFamily="18" charset="0"/>
+              </a:rPr>
+              <a:t>(Acho que aqui o Sergio vai poder nos ajudar mais)</a:t>
+            </a:r>
+            <a:endParaRPr lang="pt-BR" dirty="0"/>
+          </a:p>
+        </p:txBody>
+      </p:sp>
+      <p:sp>
+        <p:nvSpPr>
+          <p:cNvPr id="9" name="CaixaDeTexto 8">
+            <a:extLst>
+              <a:ext uri="{FF2B5EF4-FFF2-40B4-BE49-F238E27FC236}">
+                <a16:creationId xmlns:a16="http://schemas.microsoft.com/office/drawing/2014/main" id="{F486EA76-638A-4E60-A9B7-B9FE71965D6E}"/>
+              </a:ext>
+            </a:extLst>
+          </p:cNvPr>
+          <p:cNvSpPr txBox="1"/>
+          <p:nvPr/>
+        </p:nvSpPr>
+        <p:spPr>
+          <a:xfrm>
+            <a:off x="158934" y="925093"/>
+            <a:ext cx="6098344" cy="1200329"/>
+          </a:xfrm>
+          <a:prstGeom prst="rect">
+            <a:avLst/>
+          </a:prstGeom>
+          <a:noFill/>
+        </p:spPr>
+        <p:txBody>
+          <a:bodyPr wrap="square">
+            <a:spAutoFit/>
+          </a:bodyPr>
+          <a:lstStyle/>
+          <a:p>
+            <a:r>
+              <a:rPr lang="pt-BR" dirty="0">
+                <a:solidFill>
+                  <a:srgbClr val="FF0000"/>
+                </a:solidFill>
+                <a:ea typeface="Calibri" panose="020F0502020204030204" pitchFamily="34" charset="0"/>
+                <a:cs typeface="Times New Roman" panose="02020603050405020304" pitchFamily="18" charset="0"/>
+              </a:rPr>
+              <a:t>(A meu ver, depois da conversa com o professor nosso problema não é mais mostrar os benefícios da fotovoltaica e sim, </a:t>
+            </a:r>
+            <a:r>
+              <a:rPr lang="pt-BR" b="1" dirty="0">
+                <a:solidFill>
+                  <a:srgbClr val="FF0000"/>
+                </a:solidFill>
+                <a:ea typeface="Calibri" panose="020F0502020204030204" pitchFamily="34" charset="0"/>
+                <a:cs typeface="Times New Roman" panose="02020603050405020304" pitchFamily="18" charset="0"/>
+              </a:rPr>
+              <a:t>sugerir uma proposta factível para que o governo de incentivo.) </a:t>
+            </a:r>
+            <a:r>
+              <a:rPr lang="pt-BR" dirty="0">
+                <a:solidFill>
+                  <a:srgbClr val="FF0000"/>
+                </a:solidFill>
+                <a:ea typeface="Calibri" panose="020F0502020204030204" pitchFamily="34" charset="0"/>
+                <a:cs typeface="Times New Roman" panose="02020603050405020304" pitchFamily="18" charset="0"/>
+              </a:rPr>
+              <a:t>Posso estar enganado?</a:t>
+            </a:r>
+            <a:endParaRPr lang="pt-BR" dirty="0"/>
+          </a:p>
+        </p:txBody>
+      </p:sp>
+    </p:spTree>
+    <p:extLst>
+      <p:ext uri="{BB962C8B-B14F-4D97-AF65-F5344CB8AC3E}">
+        <p14:creationId xmlns:p14="http://schemas.microsoft.com/office/powerpoint/2010/main" val="2778759226"/>
+      </p:ext>
+    </p:extLst>
+  </p:cSld>
+  <p:clrMapOvr>
+    <a:masterClrMapping/>
+  </p:clrMapOvr>
+</p:sld>
+</file>
+
+<file path=ppt/slides/slide12.xml><?xml version="1.0" encoding="utf-8"?>
+<p:sld xmlns:a="http://schemas.openxmlformats.org/drawingml/2006/main" xmlns:r="http://schemas.openxmlformats.org/officeDocument/2006/relationships" xmlns:p="http://schemas.openxmlformats.org/presentationml/2006/main">
+  <p:cSld>
+    <p:spTree>
+      <p:nvGrpSpPr>
+        <p:cNvPr id="1" name=""/>
+        <p:cNvGrpSpPr/>
+        <p:nvPr/>
+      </p:nvGrpSpPr>
+      <p:grpSpPr>
+        <a:xfrm>
+          <a:off x="0" y="0"/>
+          <a:ext cx="0" cy="0"/>
+          <a:chOff x="0" y="0"/>
+          <a:chExt cx="0" cy="0"/>
+        </a:xfrm>
+      </p:grpSpPr>
+      <p:sp>
+        <p:nvSpPr>
           <p:cNvPr id="3" name="CaixaDeTexto 2">
             <a:extLst>
               <a:ext uri="{FF2B5EF4-FFF2-40B4-BE49-F238E27FC236}">
@@ -4180,7 +4857,7 @@
                   <a:schemeClr val="tx1"/>
                 </a:solidFill>
               </a:rPr>
-              <a:t>10</a:t>
+              <a:t>12</a:t>
             </a:fld>
             <a:endParaRPr lang="pt-BR" sz="2500" dirty="0">
               <a:solidFill>
@@ -4831,6 +5508,25 @@
                 <a:latin typeface="Arial Black" panose="020B0A04020102020204" pitchFamily="34" charset="0"/>
               </a:rPr>
               <a:t>O QUE TEMOS HOJE?</a:t>
+            </a:r>
+          </a:p>
+          <a:p>
+            <a:pPr algn="ctr">
+              <a:spcBef>
+                <a:spcPts val="0"/>
+              </a:spcBef>
+              <a:buClr>
+                <a:schemeClr val="dk2"/>
+              </a:buClr>
+              <a:buSzPts val="4400"/>
+              <a:buFont typeface="Arial Black"/>
+              <a:buNone/>
+            </a:pPr>
+            <a:r>
+              <a:rPr lang="en-US" sz="4400" dirty="0">
+                <a:latin typeface="Arial Black" panose="020B0A04020102020204" pitchFamily="34" charset="0"/>
+              </a:rPr>
+              <a:t>HIDRELETRICAS</a:t>
             </a:r>
           </a:p>
         </p:txBody>
@@ -7045,268 +7741,97 @@
       </p:grpSpPr>
       <p:sp>
         <p:nvSpPr>
-          <p:cNvPr id="5" name="CaixaDeTexto 4">
-            <a:extLst>
-              <a:ext uri="{FF2B5EF4-FFF2-40B4-BE49-F238E27FC236}">
-                <a16:creationId xmlns:a16="http://schemas.microsoft.com/office/drawing/2014/main" id="{CF3707E6-01AE-4D6B-B71D-116C66A72B64}"/>
-              </a:ext>
-            </a:extLst>
-          </p:cNvPr>
-          <p:cNvSpPr txBox="1"/>
+          <p:cNvPr id="2" name="Espaço Reservado para Rodapé 1">
+            <a:extLst>
+              <a:ext uri="{FF2B5EF4-FFF2-40B4-BE49-F238E27FC236}">
+                <a16:creationId xmlns:a16="http://schemas.microsoft.com/office/drawing/2014/main" id="{1963ABA8-5821-4E70-A843-DEC9787BD83E}"/>
+              </a:ext>
+            </a:extLst>
+          </p:cNvPr>
+          <p:cNvSpPr>
+            <a:spLocks noGrp="1"/>
+          </p:cNvSpPr>
+          <p:nvPr>
+            <p:ph type="ftr" sz="quarter" idx="11"/>
+          </p:nvPr>
+        </p:nvSpPr>
+        <p:spPr/>
+        <p:txBody>
+          <a:bodyPr/>
+          <a:lstStyle/>
+          <a:p>
+            <a:r>
+              <a:rPr lang="pt-BR" dirty="0"/>
+              <a:t>Grupo Eco Energy-21</a:t>
+            </a:r>
+          </a:p>
+        </p:txBody>
+      </p:sp>
+      <p:sp>
+        <p:nvSpPr>
+          <p:cNvPr id="3" name="Espaço Reservado para Número de Slide 2">
+            <a:extLst>
+              <a:ext uri="{FF2B5EF4-FFF2-40B4-BE49-F238E27FC236}">
+                <a16:creationId xmlns:a16="http://schemas.microsoft.com/office/drawing/2014/main" id="{BBA7D1A9-CFBD-4CE9-96F8-B3810C3DE083}"/>
+              </a:ext>
+            </a:extLst>
+          </p:cNvPr>
+          <p:cNvSpPr>
+            <a:spLocks noGrp="1"/>
+          </p:cNvSpPr>
+          <p:nvPr>
+            <p:ph type="sldNum" sz="quarter" idx="12"/>
+          </p:nvPr>
+        </p:nvSpPr>
+        <p:spPr/>
+        <p:txBody>
+          <a:bodyPr/>
+          <a:lstStyle/>
+          <a:p>
+            <a:fld id="{24F432EC-2972-46C7-97C1-1EB75B8CBA8A}" type="slidenum">
+              <a:rPr lang="pt-BR" smtClean="0"/>
+              <a:t>8</a:t>
+            </a:fld>
+            <a:endParaRPr lang="pt-BR"/>
+          </a:p>
+        </p:txBody>
+      </p:sp>
+      <p:pic>
+        <p:nvPicPr>
+          <p:cNvPr id="5" name="Imagem 4">
+            <a:extLst>
+              <a:ext uri="{FF2B5EF4-FFF2-40B4-BE49-F238E27FC236}">
+                <a16:creationId xmlns:a16="http://schemas.microsoft.com/office/drawing/2014/main" id="{9876863D-4CFF-4214-84A5-D29E25F9EBEF}"/>
+              </a:ext>
+            </a:extLst>
+          </p:cNvPr>
+          <p:cNvPicPr>
+            <a:picLocks noChangeAspect="1"/>
+          </p:cNvPicPr>
           <p:nvPr/>
-        </p:nvSpPr>
+        </p:nvPicPr>
+        <p:blipFill>
+          <a:blip r:embed="rId2"/>
+          <a:stretch>
+            <a:fillRect/>
+          </a:stretch>
+        </p:blipFill>
         <p:spPr>
           <a:xfrm>
-            <a:off x="411687" y="1358404"/>
-            <a:ext cx="5313542" cy="5363071"/>
+            <a:off x="904729" y="1076354"/>
+            <a:ext cx="5402580" cy="5042916"/>
           </a:xfrm>
           <a:prstGeom prst="rect">
             <a:avLst/>
           </a:prstGeom>
-          <a:noFill/>
-        </p:spPr>
-        <p:txBody>
-          <a:bodyPr wrap="square">
-            <a:spAutoFit/>
-          </a:bodyPr>
-          <a:lstStyle/>
-          <a:p>
-            <a:pPr algn="l"/>
-            <a:r>
-              <a:rPr lang="pt-BR" sz="1400" b="1" i="0" dirty="0">
-                <a:solidFill>
-                  <a:srgbClr val="000000"/>
-                </a:solidFill>
-                <a:effectLst/>
-                <a:latin typeface="Montserrat" panose="00000500000000000000" pitchFamily="2" charset="0"/>
-              </a:rPr>
-              <a:t>Energia solar em Minas</a:t>
-            </a:r>
-          </a:p>
-          <a:p>
-            <a:pPr algn="l"/>
-            <a:r>
-              <a:rPr lang="pt-BR" sz="1400" b="0" i="0" dirty="0">
-                <a:solidFill>
-                  <a:srgbClr val="706F6F"/>
-                </a:solidFill>
-                <a:effectLst/>
-                <a:latin typeface="Lato" panose="020F0502020204030203" pitchFamily="34" charset="0"/>
-              </a:rPr>
-              <a:t>Cemig precisa acompanhar demanda pela nova energia gerada em fazenda solares e por pequenos geradores.</a:t>
-            </a:r>
-          </a:p>
-          <a:p>
-            <a:pPr algn="l"/>
-            <a:r>
-              <a:rPr lang="pt-BR" sz="1400" b="0" i="0" dirty="0">
-                <a:solidFill>
-                  <a:srgbClr val="353434"/>
-                </a:solidFill>
-                <a:effectLst/>
-                <a:latin typeface="CharterBT-Roman"/>
-              </a:rPr>
-              <a:t>Cresce em Minas a procura por áreas de grande insolação, próprias para a instalação das chamadas fazendas solares. Falta que a Cemig acelere a construção de linhas de transmissão e de subestações, essenciais para o aproveitamento, através da transferência da energia gerada. A energia solar tem o mais econômico custo de instalação por quilowatt gerado. É um investimento que dura 25 anos, gera milhares de empregos e tem seu aproveitamento muito mais barato do que as demais formas de oferta de energia. Se a Cemig fosse mais eficiente nessa percepção, vários problemas de Minas, nessa demanda da energia poderiam estar resolvidos de maneira melhor, com repercussões sociais mais eficazes. Sobretudo na geração de empregos, renda e na fixação de pessoas nas suas regiões de origem. </a:t>
-            </a:r>
-            <a:endParaRPr lang="pt-BR" sz="1400" b="0" i="0" dirty="0">
-              <a:solidFill>
-                <a:srgbClr val="706F6F"/>
-              </a:solidFill>
-              <a:effectLst/>
-              <a:latin typeface="Lato" panose="020F0502020204030203" pitchFamily="34" charset="0"/>
-            </a:endParaRPr>
-          </a:p>
-          <a:p>
-            <a:pPr algn="just">
-              <a:lnSpc>
-                <a:spcPct val="107000"/>
-              </a:lnSpc>
-              <a:spcAft>
-                <a:spcPts val="800"/>
-              </a:spcAft>
-            </a:pPr>
-            <a:endParaRPr lang="pt-BR" sz="1400" dirty="0">
-              <a:solidFill>
-                <a:srgbClr val="FF0000"/>
-              </a:solidFill>
-              <a:effectLst/>
-              <a:ea typeface="Times New Roman" panose="02020603050405020304" pitchFamily="18" charset="0"/>
-              <a:cs typeface="Times New Roman" panose="02020603050405020304" pitchFamily="18" charset="0"/>
-            </a:endParaRPr>
-          </a:p>
-          <a:p>
-            <a:pPr algn="just">
-              <a:lnSpc>
-                <a:spcPct val="107000"/>
-              </a:lnSpc>
-              <a:spcAft>
-                <a:spcPts val="800"/>
-              </a:spcAft>
-            </a:pPr>
-            <a:r>
-              <a:rPr lang="pt-BR" sz="1400" dirty="0">
-                <a:solidFill>
-                  <a:srgbClr val="FF0000"/>
-                </a:solidFill>
-                <a:effectLst/>
-                <a:ea typeface="Times New Roman" panose="02020603050405020304" pitchFamily="18" charset="0"/>
-                <a:cs typeface="Times New Roman" panose="02020603050405020304" pitchFamily="18" charset="0"/>
-              </a:rPr>
-              <a:t>As pequenas empresas produtoras de energia fotovoltaica irão fornecer serviços para a população e até mesmo outras instituições, afim de diminuir o valor gasto em energias de alto custo, visto que o custo da energia solar para o consumidor final é bem menor. Além disso, diminuir os impactos ambientais e ecológicos que as usinas hidrelétricas causam.</a:t>
-            </a:r>
-          </a:p>
-          <a:p>
-            <a:pPr algn="just">
-              <a:lnSpc>
-                <a:spcPct val="107000"/>
-              </a:lnSpc>
-              <a:spcAft>
-                <a:spcPts val="800"/>
-              </a:spcAft>
-            </a:pPr>
-            <a:r>
-              <a:rPr lang="pt-BR" sz="1400" dirty="0">
-                <a:solidFill>
-                  <a:srgbClr val="FF0000"/>
-                </a:solidFill>
-                <a:ea typeface="Calibri" panose="020F0502020204030204" pitchFamily="34" charset="0"/>
-                <a:cs typeface="Times New Roman" panose="02020603050405020304" pitchFamily="18" charset="0"/>
-              </a:rPr>
-              <a:t>(Também não entendi)</a:t>
-            </a:r>
-            <a:endParaRPr lang="pt-BR" sz="1400" dirty="0">
-              <a:solidFill>
-                <a:srgbClr val="FF0000"/>
-              </a:solidFill>
-              <a:effectLst/>
-              <a:ea typeface="Calibri" panose="020F0502020204030204" pitchFamily="34" charset="0"/>
-              <a:cs typeface="Times New Roman" panose="02020603050405020304" pitchFamily="18" charset="0"/>
-            </a:endParaRPr>
-          </a:p>
-        </p:txBody>
-      </p:sp>
-      <p:sp>
-        <p:nvSpPr>
-          <p:cNvPr id="6" name="Espaço Reservado para Rodapé 5">
-            <a:extLst>
-              <a:ext uri="{FF2B5EF4-FFF2-40B4-BE49-F238E27FC236}">
-                <a16:creationId xmlns:a16="http://schemas.microsoft.com/office/drawing/2014/main" id="{88955371-7B1B-4F45-8E0F-2D8778641381}"/>
-              </a:ext>
-            </a:extLst>
-          </p:cNvPr>
-          <p:cNvSpPr>
-            <a:spLocks noGrp="1"/>
-          </p:cNvSpPr>
-          <p:nvPr>
-            <p:ph type="ftr" sz="quarter" idx="11"/>
-          </p:nvPr>
-        </p:nvSpPr>
-        <p:spPr/>
-        <p:txBody>
-          <a:bodyPr/>
-          <a:lstStyle/>
-          <a:p>
-            <a:r>
-              <a:rPr lang="pt-BR" sz="1600" dirty="0">
-                <a:solidFill>
-                  <a:schemeClr val="tx1"/>
-                </a:solidFill>
-              </a:rPr>
-              <a:t>Grupo Eco Energy-21</a:t>
-            </a:r>
-          </a:p>
-        </p:txBody>
-      </p:sp>
-      <p:sp>
-        <p:nvSpPr>
-          <p:cNvPr id="8" name="Espaço Reservado para Número de Slide 7">
-            <a:extLst>
-              <a:ext uri="{FF2B5EF4-FFF2-40B4-BE49-F238E27FC236}">
-                <a16:creationId xmlns:a16="http://schemas.microsoft.com/office/drawing/2014/main" id="{273E7CE3-7453-4B12-99B7-327A5F637046}"/>
-              </a:ext>
-            </a:extLst>
-          </p:cNvPr>
-          <p:cNvSpPr>
-            <a:spLocks noGrp="1"/>
-          </p:cNvSpPr>
-          <p:nvPr>
-            <p:ph type="sldNum" sz="quarter" idx="12"/>
-          </p:nvPr>
-        </p:nvSpPr>
-        <p:spPr/>
-        <p:txBody>
-          <a:bodyPr/>
-          <a:lstStyle/>
-          <a:p>
-            <a:fld id="{24F432EC-2972-46C7-97C1-1EB75B8CBA8A}" type="slidenum">
-              <a:rPr lang="pt-BR" sz="2500" smtClean="0">
-                <a:solidFill>
-                  <a:schemeClr val="tx1"/>
-                </a:solidFill>
-              </a:rPr>
-              <a:t>8</a:t>
-            </a:fld>
-            <a:endParaRPr lang="pt-BR" sz="2500">
-              <a:solidFill>
-                <a:schemeClr val="tx1"/>
-              </a:solidFill>
-            </a:endParaRPr>
-          </a:p>
-        </p:txBody>
-      </p:sp>
-      <p:pic>
-        <p:nvPicPr>
-          <p:cNvPr id="2050" name="Picture 2" descr="Atividade Avaliativa 1 – Gestão de Projetos Empresariais – 5º Semestre 2019  – Gestão Empresarial FATEC">
-            <a:extLst>
-              <a:ext uri="{FF2B5EF4-FFF2-40B4-BE49-F238E27FC236}">
-                <a16:creationId xmlns:a16="http://schemas.microsoft.com/office/drawing/2014/main" id="{A09F79F5-CA4D-4AFC-B70F-10D281AC8AD1}"/>
-              </a:ext>
-            </a:extLst>
-          </p:cNvPr>
-          <p:cNvPicPr>
-            <a:picLocks noChangeAspect="1" noChangeArrowheads="1"/>
-          </p:cNvPicPr>
-          <p:nvPr/>
-        </p:nvPicPr>
-        <p:blipFill>
-          <a:blip r:embed="rId2">
-            <a:extLst>
-              <a:ext uri="{28A0092B-C50C-407E-A947-70E740481C1C}">
-                <a14:useLocalDpi xmlns:a14="http://schemas.microsoft.com/office/drawing/2010/main" val="0"/>
-              </a:ext>
-            </a:extLst>
-          </a:blip>
-          <a:srcRect/>
-          <a:stretch>
-            <a:fillRect/>
-          </a:stretch>
-        </p:blipFill>
-        <p:spPr bwMode="auto">
-          <a:xfrm>
-            <a:off x="6151223" y="1632670"/>
-            <a:ext cx="5274293" cy="2687538"/>
-          </a:xfrm>
-          <a:prstGeom prst="rect">
-            <a:avLst/>
-          </a:prstGeom>
-          <a:noFill/>
-          <a:extLst>
-            <a:ext uri="{909E8E84-426E-40DD-AFC4-6F175D3DCCD1}">
-              <a14:hiddenFill xmlns:a14="http://schemas.microsoft.com/office/drawing/2010/main">
-                <a:solidFill>
-                  <a:srgbClr val="FFFFFF"/>
-                </a:solidFill>
-              </a14:hiddenFill>
-            </a:ext>
-          </a:extLst>
         </p:spPr>
       </p:pic>
       <p:sp>
         <p:nvSpPr>
-          <p:cNvPr id="7" name="CaixaDeTexto 6">
-            <a:extLst>
-              <a:ext uri="{FF2B5EF4-FFF2-40B4-BE49-F238E27FC236}">
-                <a16:creationId xmlns:a16="http://schemas.microsoft.com/office/drawing/2014/main" id="{7597B04F-E324-4254-B89D-8EE5C80F19FA}"/>
+          <p:cNvPr id="6" name="CaixaDeTexto 5">
+            <a:extLst>
+              <a:ext uri="{FF2B5EF4-FFF2-40B4-BE49-F238E27FC236}">
+                <a16:creationId xmlns:a16="http://schemas.microsoft.com/office/drawing/2014/main" id="{7DDF27F4-680C-4D79-B716-247C8B1488BE}"/>
               </a:ext>
             </a:extLst>
           </p:cNvPr>
@@ -7344,7 +7869,7 @@
     </p:spTree>
     <p:extLst>
       <p:ext uri="{BB962C8B-B14F-4D97-AF65-F5344CB8AC3E}">
-        <p14:creationId xmlns:p14="http://schemas.microsoft.com/office/powerpoint/2010/main" val="779086811"/>
+        <p14:creationId xmlns:p14="http://schemas.microsoft.com/office/powerpoint/2010/main" val="2842777261"/>
       </p:ext>
     </p:extLst>
   </p:cSld>
@@ -7373,10 +7898,67 @@
       </p:grpSpPr>
       <p:sp>
         <p:nvSpPr>
-          <p:cNvPr id="3" name="CaixaDeTexto 2">
-            <a:extLst>
-              <a:ext uri="{FF2B5EF4-FFF2-40B4-BE49-F238E27FC236}">
-                <a16:creationId xmlns:a16="http://schemas.microsoft.com/office/drawing/2014/main" id="{C4E4B2FD-EA94-46F9-8957-15BE8504D9BB}"/>
+          <p:cNvPr id="2" name="Espaço Reservado para Rodapé 1">
+            <a:extLst>
+              <a:ext uri="{FF2B5EF4-FFF2-40B4-BE49-F238E27FC236}">
+                <a16:creationId xmlns:a16="http://schemas.microsoft.com/office/drawing/2014/main" id="{DB9621B8-392F-4A63-85DA-25493549AF04}"/>
+              </a:ext>
+            </a:extLst>
+          </p:cNvPr>
+          <p:cNvSpPr>
+            <a:spLocks noGrp="1"/>
+          </p:cNvSpPr>
+          <p:nvPr>
+            <p:ph type="ftr" sz="quarter" idx="11"/>
+          </p:nvPr>
+        </p:nvSpPr>
+        <p:spPr/>
+        <p:txBody>
+          <a:bodyPr/>
+          <a:lstStyle/>
+          <a:p>
+            <a:r>
+              <a:rPr lang="pt-BR" dirty="0"/>
+              <a:t>Grupo Eco Energy-21</a:t>
+            </a:r>
+          </a:p>
+        </p:txBody>
+      </p:sp>
+      <p:sp>
+        <p:nvSpPr>
+          <p:cNvPr id="3" name="Espaço Reservado para Número de Slide 2">
+            <a:extLst>
+              <a:ext uri="{FF2B5EF4-FFF2-40B4-BE49-F238E27FC236}">
+                <a16:creationId xmlns:a16="http://schemas.microsoft.com/office/drawing/2014/main" id="{830827E3-A710-4161-8772-5B3C1E5FD2AB}"/>
+              </a:ext>
+            </a:extLst>
+          </p:cNvPr>
+          <p:cNvSpPr>
+            <a:spLocks noGrp="1"/>
+          </p:cNvSpPr>
+          <p:nvPr>
+            <p:ph type="sldNum" sz="quarter" idx="12"/>
+          </p:nvPr>
+        </p:nvSpPr>
+        <p:spPr/>
+        <p:txBody>
+          <a:bodyPr/>
+          <a:lstStyle/>
+          <a:p>
+            <a:fld id="{24F432EC-2972-46C7-97C1-1EB75B8CBA8A}" type="slidenum">
+              <a:rPr lang="pt-BR" smtClean="0"/>
+              <a:t>9</a:t>
+            </a:fld>
+            <a:endParaRPr lang="pt-BR"/>
+          </a:p>
+        </p:txBody>
+      </p:sp>
+      <p:sp>
+        <p:nvSpPr>
+          <p:cNvPr id="5" name="CaixaDeTexto 4">
+            <a:extLst>
+              <a:ext uri="{FF2B5EF4-FFF2-40B4-BE49-F238E27FC236}">
+                <a16:creationId xmlns:a16="http://schemas.microsoft.com/office/drawing/2014/main" id="{E54B92CE-20CD-406A-A823-B22E4580870E}"/>
               </a:ext>
             </a:extLst>
           </p:cNvPr>
@@ -7385,8 +7967,8 @@
         </p:nvSpPr>
         <p:spPr>
           <a:xfrm>
-            <a:off x="2394012" y="270314"/>
-            <a:ext cx="7726532" cy="769441"/>
+            <a:off x="808383" y="940979"/>
+            <a:ext cx="6096000" cy="4976042"/>
           </a:xfrm>
           <a:prstGeom prst="rect">
             <a:avLst/>
@@ -7399,24 +7981,210 @@
           </a:bodyPr>
           <a:lstStyle/>
           <a:p>
-            <a:pPr algn="ctr"/>
-            <a:r>
-              <a:rPr lang="en-US" sz="4400" b="1" dirty="0">
-                <a:latin typeface="Arial Black"/>
-                <a:sym typeface="Arial Black"/>
-              </a:rPr>
-              <a:t>PROJETO</a:t>
-            </a:r>
-            <a:endParaRPr lang="pt-BR" sz="4400" dirty="0"/>
-          </a:p>
-        </p:txBody>
-      </p:sp>
-      <p:sp>
-        <p:nvSpPr>
-          <p:cNvPr id="5" name="CaixaDeTexto 4">
-            <a:extLst>
-              <a:ext uri="{FF2B5EF4-FFF2-40B4-BE49-F238E27FC236}">
-                <a16:creationId xmlns:a16="http://schemas.microsoft.com/office/drawing/2014/main" id="{CF3707E6-01AE-4D6B-B71D-116C66A72B64}"/>
+            <a:pPr>
+              <a:lnSpc>
+                <a:spcPct val="107000"/>
+              </a:lnSpc>
+              <a:spcBef>
+                <a:spcPts val="200"/>
+              </a:spcBef>
+            </a:pPr>
+            <a:r>
+              <a:rPr lang="pt-BR" sz="2400" b="1" dirty="0">
+                <a:solidFill>
+                  <a:srgbClr val="7A7A7A"/>
+                </a:solidFill>
+                <a:effectLst/>
+                <a:latin typeface="Montserrat" panose="00000500000000000000" pitchFamily="2" charset="0"/>
+                <a:ea typeface="Times New Roman" panose="02020603050405020304" pitchFamily="18" charset="0"/>
+                <a:cs typeface="Times New Roman" panose="02020603050405020304" pitchFamily="18" charset="0"/>
+              </a:rPr>
+              <a:t>Pontos que merecem atenção</a:t>
+            </a:r>
+            <a:endParaRPr lang="pt-BR" sz="2400" b="1" dirty="0">
+              <a:solidFill>
+                <a:srgbClr val="2F5496"/>
+              </a:solidFill>
+              <a:effectLst/>
+              <a:latin typeface="Calibri Light" panose="020F0302020204030204" pitchFamily="34" charset="0"/>
+              <a:ea typeface="Times New Roman" panose="02020603050405020304" pitchFamily="18" charset="0"/>
+              <a:cs typeface="Times New Roman" panose="02020603050405020304" pitchFamily="18" charset="0"/>
+            </a:endParaRPr>
+          </a:p>
+          <a:p>
+            <a:r>
+              <a:rPr lang="pt-BR" sz="2000" dirty="0">
+                <a:solidFill>
+                  <a:srgbClr val="7A7A7A"/>
+                </a:solidFill>
+                <a:effectLst/>
+                <a:latin typeface="Montserrat" panose="00000500000000000000" pitchFamily="2" charset="0"/>
+                <a:ea typeface="Times New Roman" panose="02020603050405020304" pitchFamily="18" charset="0"/>
+              </a:rPr>
+              <a:t>Apesar de apresentar inúmeros benefícios, conforme vimos acima, essa fonte de energia possui alguns pontos de atenção que precisam ser mencionados:</a:t>
+            </a:r>
+            <a:endParaRPr lang="pt-BR" sz="2000" dirty="0">
+              <a:effectLst/>
+              <a:latin typeface="Times New Roman" panose="02020603050405020304" pitchFamily="18" charset="0"/>
+              <a:ea typeface="Times New Roman" panose="02020603050405020304" pitchFamily="18" charset="0"/>
+            </a:endParaRPr>
+          </a:p>
+          <a:p>
+            <a:pPr marL="342900" lvl="0" indent="-342900" fontAlgn="base">
+              <a:lnSpc>
+                <a:spcPct val="107000"/>
+              </a:lnSpc>
+              <a:spcAft>
+                <a:spcPts val="800"/>
+              </a:spcAft>
+              <a:buSzPts val="1000"/>
+              <a:buFont typeface="Symbol" panose="05050102010706020507" pitchFamily="18" charset="2"/>
+              <a:buChar char=""/>
+              <a:tabLst>
+                <a:tab pos="457200" algn="l"/>
+              </a:tabLst>
+            </a:pPr>
+            <a:r>
+              <a:rPr lang="pt-BR" sz="1800" dirty="0">
+                <a:solidFill>
+                  <a:srgbClr val="7A7A7A"/>
+                </a:solidFill>
+                <a:effectLst/>
+                <a:latin typeface="Montserrat" panose="00000500000000000000" pitchFamily="2" charset="0"/>
+                <a:ea typeface="Calibri" panose="020F0502020204030204" pitchFamily="34" charset="0"/>
+                <a:cs typeface="Times New Roman" panose="02020603050405020304" pitchFamily="18" charset="0"/>
+              </a:rPr>
+              <a:t>Produção variável de acordo com as condições atmosféricas;</a:t>
+            </a:r>
+            <a:endParaRPr lang="pt-BR" sz="1800" dirty="0">
+              <a:solidFill>
+                <a:srgbClr val="7A7A7A"/>
+              </a:solidFill>
+              <a:effectLst/>
+              <a:latin typeface="Calibri" panose="020F0502020204030204" pitchFamily="34" charset="0"/>
+              <a:ea typeface="Calibri" panose="020F0502020204030204" pitchFamily="34" charset="0"/>
+              <a:cs typeface="Times New Roman" panose="02020603050405020304" pitchFamily="18" charset="0"/>
+            </a:endParaRPr>
+          </a:p>
+          <a:p>
+            <a:pPr marL="342900" lvl="0" indent="-342900" fontAlgn="base">
+              <a:lnSpc>
+                <a:spcPct val="107000"/>
+              </a:lnSpc>
+              <a:spcAft>
+                <a:spcPts val="800"/>
+              </a:spcAft>
+              <a:buSzPts val="1000"/>
+              <a:buFont typeface="Symbol" panose="05050102010706020507" pitchFamily="18" charset="2"/>
+              <a:buChar char=""/>
+              <a:tabLst>
+                <a:tab pos="457200" algn="l"/>
+              </a:tabLst>
+            </a:pPr>
+            <a:r>
+              <a:rPr lang="pt-BR" sz="1800" dirty="0">
+                <a:solidFill>
+                  <a:srgbClr val="7A7A7A"/>
+                </a:solidFill>
+                <a:effectLst/>
+                <a:latin typeface="Montserrat" panose="00000500000000000000" pitchFamily="2" charset="0"/>
+                <a:ea typeface="Calibri" panose="020F0502020204030204" pitchFamily="34" charset="0"/>
+                <a:cs typeface="Times New Roman" panose="02020603050405020304" pitchFamily="18" charset="0"/>
+              </a:rPr>
+              <a:t>Durante a noite, a energia solar não é produzida;</a:t>
+            </a:r>
+            <a:endParaRPr lang="pt-BR" sz="1800" dirty="0">
+              <a:solidFill>
+                <a:srgbClr val="7A7A7A"/>
+              </a:solidFill>
+              <a:effectLst/>
+              <a:latin typeface="Calibri" panose="020F0502020204030204" pitchFamily="34" charset="0"/>
+              <a:ea typeface="Calibri" panose="020F0502020204030204" pitchFamily="34" charset="0"/>
+              <a:cs typeface="Times New Roman" panose="02020603050405020304" pitchFamily="18" charset="0"/>
+            </a:endParaRPr>
+          </a:p>
+          <a:p>
+            <a:pPr marL="342900" lvl="0" indent="-342900" fontAlgn="base">
+              <a:lnSpc>
+                <a:spcPct val="107000"/>
+              </a:lnSpc>
+              <a:spcAft>
+                <a:spcPts val="800"/>
+              </a:spcAft>
+              <a:buSzPts val="1000"/>
+              <a:buFont typeface="Symbol" panose="05050102010706020507" pitchFamily="18" charset="2"/>
+              <a:buChar char=""/>
+              <a:tabLst>
+                <a:tab pos="457200" algn="l"/>
+              </a:tabLst>
+            </a:pPr>
+            <a:r>
+              <a:rPr lang="pt-BR" sz="1800" dirty="0">
+                <a:solidFill>
+                  <a:srgbClr val="7A7A7A"/>
+                </a:solidFill>
+                <a:effectLst/>
+                <a:latin typeface="Montserrat" panose="00000500000000000000" pitchFamily="2" charset="0"/>
+                <a:ea typeface="Calibri" panose="020F0502020204030204" pitchFamily="34" charset="0"/>
+                <a:cs typeface="Times New Roman" panose="02020603050405020304" pitchFamily="18" charset="0"/>
+              </a:rPr>
+              <a:t>Regiões localizadas em latitudes médias/altas produzem pouca energia solar durante o inverno;</a:t>
+            </a:r>
+            <a:endParaRPr lang="pt-BR" sz="1800" dirty="0">
+              <a:solidFill>
+                <a:srgbClr val="7A7A7A"/>
+              </a:solidFill>
+              <a:effectLst/>
+              <a:latin typeface="Calibri" panose="020F0502020204030204" pitchFamily="34" charset="0"/>
+              <a:ea typeface="Calibri" panose="020F0502020204030204" pitchFamily="34" charset="0"/>
+              <a:cs typeface="Times New Roman" panose="02020603050405020304" pitchFamily="18" charset="0"/>
+            </a:endParaRPr>
+          </a:p>
+          <a:p>
+            <a:pPr marL="342900" lvl="0" indent="-342900" fontAlgn="base">
+              <a:lnSpc>
+                <a:spcPct val="107000"/>
+              </a:lnSpc>
+              <a:spcAft>
+                <a:spcPts val="800"/>
+              </a:spcAft>
+              <a:buSzPts val="1000"/>
+              <a:buFont typeface="Symbol" panose="05050102010706020507" pitchFamily="18" charset="2"/>
+              <a:buChar char=""/>
+              <a:tabLst>
+                <a:tab pos="457200" algn="l"/>
+              </a:tabLst>
+            </a:pPr>
+            <a:r>
+              <a:rPr lang="pt-BR" sz="1800" dirty="0">
+                <a:solidFill>
+                  <a:srgbClr val="7A7A7A"/>
+                </a:solidFill>
+                <a:effectLst/>
+                <a:latin typeface="Montserrat" panose="00000500000000000000" pitchFamily="2" charset="0"/>
+                <a:ea typeface="Calibri" panose="020F0502020204030204" pitchFamily="34" charset="0"/>
+                <a:cs typeface="Times New Roman" panose="02020603050405020304" pitchFamily="18" charset="0"/>
+              </a:rPr>
+              <a:t>O armazenamento desse tipo de energia é pouco eficiente se comparado à energia hidrelétrica, aos combustíveis fósseis e à biomassa.</a:t>
+            </a:r>
+            <a:endParaRPr lang="pt-BR" sz="1800" dirty="0">
+              <a:solidFill>
+                <a:srgbClr val="7A7A7A"/>
+              </a:solidFill>
+              <a:effectLst/>
+              <a:latin typeface="Calibri" panose="020F0502020204030204" pitchFamily="34" charset="0"/>
+              <a:ea typeface="Calibri" panose="020F0502020204030204" pitchFamily="34" charset="0"/>
+              <a:cs typeface="Times New Roman" panose="02020603050405020304" pitchFamily="18" charset="0"/>
+            </a:endParaRPr>
+          </a:p>
+        </p:txBody>
+      </p:sp>
+      <p:sp>
+        <p:nvSpPr>
+          <p:cNvPr id="6" name="CaixaDeTexto 5">
+            <a:extLst>
+              <a:ext uri="{FF2B5EF4-FFF2-40B4-BE49-F238E27FC236}">
+                <a16:creationId xmlns:a16="http://schemas.microsoft.com/office/drawing/2014/main" id="{22274FA8-C94A-43EE-9387-DF4A50D2FA23}"/>
               </a:ext>
             </a:extLst>
           </p:cNvPr>
@@ -7425,8 +8193,8 @@
         </p:nvSpPr>
         <p:spPr>
           <a:xfrm>
-            <a:off x="361326" y="2312772"/>
-            <a:ext cx="5313542" cy="3336811"/>
+            <a:off x="1060175" y="270314"/>
+            <a:ext cx="10137912" cy="707886"/>
           </a:xfrm>
           <a:prstGeom prst="rect">
             <a:avLst/>
@@ -7439,257 +8207,22 @@
           </a:bodyPr>
           <a:lstStyle/>
           <a:p>
-            <a:pPr algn="just">
-              <a:lnSpc>
-                <a:spcPct val="107000"/>
-              </a:lnSpc>
-              <a:spcAft>
-                <a:spcPts val="800"/>
-              </a:spcAft>
-            </a:pPr>
-            <a:r>
-              <a:rPr lang="pt-BR" sz="2200" dirty="0">
-                <a:solidFill>
-                  <a:srgbClr val="212529"/>
-                </a:solidFill>
-                <a:effectLst/>
-                <a:ea typeface="Times New Roman" panose="02020603050405020304" pitchFamily="18" charset="0"/>
-                <a:cs typeface="Times New Roman" panose="02020603050405020304" pitchFamily="18" charset="0"/>
-              </a:rPr>
-              <a:t>O projeto, teria a colaboração de vários produtores de energia fotovoltaica, também seria adicionado um incentivo governamental para proporcionar o crescimento na área. O projeto ainda contará com um sistema de software que terá como finalidade o monitoramento e análise das placas solares, esse seria gerido por uma empresa parceira do projeto.</a:t>
-            </a:r>
-            <a:endParaRPr lang="pt-BR" sz="2200" dirty="0">
-              <a:effectLst/>
-              <a:ea typeface="Calibri" panose="020F0502020204030204" pitchFamily="34" charset="0"/>
-              <a:cs typeface="Times New Roman" panose="02020603050405020304" pitchFamily="18" charset="0"/>
-            </a:endParaRPr>
-          </a:p>
-        </p:txBody>
-      </p:sp>
-      <p:sp>
-        <p:nvSpPr>
-          <p:cNvPr id="6" name="Espaço Reservado para Rodapé 5">
-            <a:extLst>
-              <a:ext uri="{FF2B5EF4-FFF2-40B4-BE49-F238E27FC236}">
-                <a16:creationId xmlns:a16="http://schemas.microsoft.com/office/drawing/2014/main" id="{88955371-7B1B-4F45-8E0F-2D8778641381}"/>
-              </a:ext>
-            </a:extLst>
-          </p:cNvPr>
-          <p:cNvSpPr>
-            <a:spLocks noGrp="1"/>
-          </p:cNvSpPr>
-          <p:nvPr>
-            <p:ph type="ftr" sz="quarter" idx="11"/>
-          </p:nvPr>
-        </p:nvSpPr>
-        <p:spPr/>
-        <p:txBody>
-          <a:bodyPr/>
-          <a:lstStyle/>
-          <a:p>
-            <a:r>
-              <a:rPr lang="pt-BR" sz="1600" dirty="0">
-                <a:solidFill>
-                  <a:schemeClr val="tx1"/>
-                </a:solidFill>
-              </a:rPr>
-              <a:t>Grupo Eco Energy-21</a:t>
-            </a:r>
-          </a:p>
-        </p:txBody>
-      </p:sp>
-      <p:sp>
-        <p:nvSpPr>
-          <p:cNvPr id="8" name="Espaço Reservado para Número de Slide 7">
-            <a:extLst>
-              <a:ext uri="{FF2B5EF4-FFF2-40B4-BE49-F238E27FC236}">
-                <a16:creationId xmlns:a16="http://schemas.microsoft.com/office/drawing/2014/main" id="{273E7CE3-7453-4B12-99B7-327A5F637046}"/>
-              </a:ext>
-            </a:extLst>
-          </p:cNvPr>
-          <p:cNvSpPr>
-            <a:spLocks noGrp="1"/>
-          </p:cNvSpPr>
-          <p:nvPr>
-            <p:ph type="sldNum" sz="quarter" idx="12"/>
-          </p:nvPr>
-        </p:nvSpPr>
-        <p:spPr/>
-        <p:txBody>
-          <a:bodyPr/>
-          <a:lstStyle/>
-          <a:p>
-            <a:fld id="{24F432EC-2972-46C7-97C1-1EB75B8CBA8A}" type="slidenum">
-              <a:rPr lang="pt-BR" sz="2500" smtClean="0">
-                <a:solidFill>
-                  <a:schemeClr val="tx1"/>
-                </a:solidFill>
-              </a:rPr>
-              <a:t>9</a:t>
-            </a:fld>
-            <a:endParaRPr lang="pt-BR" sz="2500">
-              <a:solidFill>
-                <a:schemeClr val="tx1"/>
-              </a:solidFill>
-            </a:endParaRPr>
-          </a:p>
-        </p:txBody>
-      </p:sp>
-      <p:pic>
-        <p:nvPicPr>
-          <p:cNvPr id="3074" name="Picture 2" descr="Você sabe como funcionam as parcerias entre empresas?">
-            <a:extLst>
-              <a:ext uri="{FF2B5EF4-FFF2-40B4-BE49-F238E27FC236}">
-                <a16:creationId xmlns:a16="http://schemas.microsoft.com/office/drawing/2014/main" id="{97A6FE06-8228-49DE-9AE4-06CCDC54C135}"/>
-              </a:ext>
-            </a:extLst>
-          </p:cNvPr>
-          <p:cNvPicPr>
-            <a:picLocks noChangeAspect="1" noChangeArrowheads="1"/>
-          </p:cNvPicPr>
-          <p:nvPr/>
-        </p:nvPicPr>
-        <p:blipFill>
-          <a:blip r:embed="rId2">
-            <a:extLst>
-              <a:ext uri="{28A0092B-C50C-407E-A947-70E740481C1C}">
-                <a14:useLocalDpi xmlns:a14="http://schemas.microsoft.com/office/drawing/2010/main" val="0"/>
-              </a:ext>
-            </a:extLst>
-          </a:blip>
-          <a:srcRect/>
-          <a:stretch>
-            <a:fillRect/>
-          </a:stretch>
-        </p:blipFill>
-        <p:spPr bwMode="auto">
-          <a:xfrm>
-            <a:off x="6279356" y="1464585"/>
-            <a:ext cx="4662487" cy="3102673"/>
-          </a:xfrm>
-          <a:prstGeom prst="rect">
-            <a:avLst/>
-          </a:prstGeom>
-          <a:noFill/>
-          <a:extLst>
-            <a:ext uri="{909E8E84-426E-40DD-AFC4-6F175D3DCCD1}">
-              <a14:hiddenFill xmlns:a14="http://schemas.microsoft.com/office/drawing/2010/main">
-                <a:solidFill>
-                  <a:srgbClr val="FFFFFF"/>
-                </a:solidFill>
-              </a14:hiddenFill>
-            </a:ext>
-          </a:extLst>
-        </p:spPr>
-      </p:pic>
-      <p:sp>
-        <p:nvSpPr>
-          <p:cNvPr id="7" name="CaixaDeTexto 6">
-            <a:extLst>
-              <a:ext uri="{FF2B5EF4-FFF2-40B4-BE49-F238E27FC236}">
-                <a16:creationId xmlns:a16="http://schemas.microsoft.com/office/drawing/2014/main" id="{0499B026-AC6A-4C50-91D3-FE842932019A}"/>
-              </a:ext>
-            </a:extLst>
-          </p:cNvPr>
-          <p:cNvSpPr txBox="1"/>
-          <p:nvPr/>
-        </p:nvSpPr>
-        <p:spPr>
-          <a:xfrm>
-            <a:off x="398738" y="5686394"/>
-            <a:ext cx="6098344" cy="369332"/>
-          </a:xfrm>
-          <a:prstGeom prst="rect">
-            <a:avLst/>
-          </a:prstGeom>
-          <a:noFill/>
-        </p:spPr>
-        <p:txBody>
-          <a:bodyPr wrap="square">
-            <a:spAutoFit/>
-          </a:bodyPr>
-          <a:lstStyle/>
-          <a:p>
-            <a:r>
-              <a:rPr lang="pt-BR" sz="1800" dirty="0">
-                <a:solidFill>
-                  <a:srgbClr val="FF0000"/>
-                </a:solidFill>
-                <a:ea typeface="Calibri" panose="020F0502020204030204" pitchFamily="34" charset="0"/>
-                <a:cs typeface="Times New Roman" panose="02020603050405020304" pitchFamily="18" charset="0"/>
-              </a:rPr>
-              <a:t>(Acho que aqui o Sergio vai poder nos ajudar mais)</a:t>
-            </a:r>
-            <a:endParaRPr lang="pt-BR" dirty="0"/>
-          </a:p>
-        </p:txBody>
-      </p:sp>
-      <p:sp>
-        <p:nvSpPr>
-          <p:cNvPr id="9" name="CaixaDeTexto 8">
-            <a:extLst>
-              <a:ext uri="{FF2B5EF4-FFF2-40B4-BE49-F238E27FC236}">
-                <a16:creationId xmlns:a16="http://schemas.microsoft.com/office/drawing/2014/main" id="{F486EA76-638A-4E60-A9B7-B9FE71965D6E}"/>
-              </a:ext>
-            </a:extLst>
-          </p:cNvPr>
-          <p:cNvSpPr txBox="1"/>
-          <p:nvPr/>
-        </p:nvSpPr>
-        <p:spPr>
-          <a:xfrm>
-            <a:off x="158934" y="925093"/>
-            <a:ext cx="6098344" cy="1200329"/>
-          </a:xfrm>
-          <a:prstGeom prst="rect">
-            <a:avLst/>
-          </a:prstGeom>
-          <a:noFill/>
-        </p:spPr>
-        <p:txBody>
-          <a:bodyPr wrap="square">
-            <a:spAutoFit/>
-          </a:bodyPr>
-          <a:lstStyle/>
-          <a:p>
-            <a:r>
-              <a:rPr lang="pt-BR" dirty="0">
-                <a:solidFill>
-                  <a:srgbClr val="FF0000"/>
-                </a:solidFill>
-                <a:ea typeface="Calibri" panose="020F0502020204030204" pitchFamily="34" charset="0"/>
-                <a:cs typeface="Times New Roman" panose="02020603050405020304" pitchFamily="18" charset="0"/>
-              </a:rPr>
-              <a:t>(A meu ver, depois da conversa com o professor nosso problema não é mais mostrar os benefícios da fotovoltaica e sim, </a:t>
-            </a:r>
-            <a:r>
-              <a:rPr lang="pt-BR" b="1" dirty="0">
-                <a:solidFill>
-                  <a:srgbClr val="FF0000"/>
-                </a:solidFill>
-                <a:ea typeface="Calibri" panose="020F0502020204030204" pitchFamily="34" charset="0"/>
-                <a:cs typeface="Times New Roman" panose="02020603050405020304" pitchFamily="18" charset="0"/>
-              </a:rPr>
-              <a:t>sugerir uma proposta factível para que o governo de incentivo.) </a:t>
-            </a:r>
-            <a:r>
-              <a:rPr lang="pt-BR" dirty="0">
-                <a:solidFill>
-                  <a:srgbClr val="FF0000"/>
-                </a:solidFill>
-                <a:ea typeface="Calibri" panose="020F0502020204030204" pitchFamily="34" charset="0"/>
-                <a:cs typeface="Times New Roman" panose="02020603050405020304" pitchFamily="18" charset="0"/>
-              </a:rPr>
-              <a:t>Posso estar enganado?</a:t>
-            </a:r>
-            <a:endParaRPr lang="pt-BR" dirty="0"/>
+            <a:pPr algn="ctr"/>
+            <a:r>
+              <a:rPr lang="en-US" sz="4000" b="1" dirty="0">
+                <a:latin typeface="Arial Black"/>
+                <a:sym typeface="Arial Black"/>
+              </a:rPr>
+              <a:t>HORIZONTE QUE SE APRESENTA</a:t>
+            </a:r>
+            <a:endParaRPr lang="pt-BR" sz="4000" dirty="0"/>
           </a:p>
         </p:txBody>
       </p:sp>
     </p:spTree>
     <p:extLst>
       <p:ext uri="{BB962C8B-B14F-4D97-AF65-F5344CB8AC3E}">
-        <p14:creationId xmlns:p14="http://schemas.microsoft.com/office/powerpoint/2010/main" val="2778759226"/>
+        <p14:creationId xmlns:p14="http://schemas.microsoft.com/office/powerpoint/2010/main" val="990771757"/>
       </p:ext>
     </p:extLst>
   </p:cSld>

</xml_diff>

<commit_message>
Projeto Eco-Energy 21 Atualização
</commit_message>
<xml_diff>
--- a/Projeto Eco-Energy 21.pptx
+++ b/Projeto Eco-Energy 21.pptx
@@ -5,7 +5,7 @@
     <p:sldMasterId id="2147483695" r:id="rId1"/>
   </p:sldMasterIdLst>
   <p:notesMasterIdLst>
-    <p:notesMasterId r:id="rId14"/>
+    <p:notesMasterId r:id="rId15"/>
   </p:notesMasterIdLst>
   <p:sldIdLst>
     <p:sldId id="256" r:id="rId2"/>
@@ -19,7 +19,8 @@
     <p:sldId id="273" r:id="rId10"/>
     <p:sldId id="258" r:id="rId11"/>
     <p:sldId id="266" r:id="rId12"/>
-    <p:sldId id="265" r:id="rId13"/>
+    <p:sldId id="274" r:id="rId13"/>
+    <p:sldId id="275" r:id="rId14"/>
   </p:sldIdLst>
   <p:sldSz cx="12192000" cy="6858000"/>
   <p:notesSz cx="6858000" cy="9144000"/>
@@ -138,7 +139,8 @@
             <p14:sldId id="273"/>
             <p14:sldId id="258"/>
             <p14:sldId id="266"/>
-            <p14:sldId id="265"/>
+            <p14:sldId id="274"/>
+            <p14:sldId id="275"/>
           </p14:sldIdLst>
         </p14:section>
       </p14:sectionLst>
@@ -243,7 +245,7 @@
           <a:p>
             <a:fld id="{55E36DBB-8C46-496E-A26A-48622405AAA7}" type="datetimeFigureOut">
               <a:rPr lang="pt-BR" smtClean="0"/>
-              <a:t>06/11/2021</a:t>
+              <a:t>11/11/2021</a:t>
             </a:fld>
             <a:endParaRPr lang="pt-BR"/>
           </a:p>
@@ -657,7 +659,7 @@
           <a:p>
             <a:fld id="{F3DE6193-CBE8-4C5C-987F-CDB24C8D5B62}" type="datetime1">
               <a:rPr lang="pt-BR" smtClean="0"/>
-              <a:t>06/11/2021</a:t>
+              <a:t>11/11/2021</a:t>
             </a:fld>
             <a:endParaRPr lang="pt-BR"/>
           </a:p>
@@ -858,7 +860,7 @@
           <a:p>
             <a:fld id="{7894697A-3DFE-4402-9AFD-9A57A0BD07BF}" type="datetime1">
               <a:rPr lang="pt-BR" smtClean="0"/>
-              <a:t>06/11/2021</a:t>
+              <a:t>11/11/2021</a:t>
             </a:fld>
             <a:endParaRPr lang="pt-BR"/>
           </a:p>
@@ -1069,7 +1071,7 @@
           <a:p>
             <a:fld id="{D6F172C2-F604-4CAE-BE7D-C568F7307E4C}" type="datetime1">
               <a:rPr lang="pt-BR" smtClean="0"/>
-              <a:t>06/11/2021</a:t>
+              <a:t>11/11/2021</a:t>
             </a:fld>
             <a:endParaRPr lang="pt-BR"/>
           </a:p>
@@ -1270,7 +1272,7 @@
           <a:p>
             <a:fld id="{1842EDEF-D5CB-4372-A830-1BFA853B82E4}" type="datetime1">
               <a:rPr lang="pt-BR" smtClean="0"/>
-              <a:t>06/11/2021</a:t>
+              <a:t>11/11/2021</a:t>
             </a:fld>
             <a:endParaRPr lang="pt-BR"/>
           </a:p>
@@ -1548,7 +1550,7 @@
           <a:p>
             <a:fld id="{C15D167B-D4B1-42AB-BD19-40EBEF9C6203}" type="datetime1">
               <a:rPr lang="pt-BR" smtClean="0"/>
-              <a:t>06/11/2021</a:t>
+              <a:t>11/11/2021</a:t>
             </a:fld>
             <a:endParaRPr lang="pt-BR"/>
           </a:p>
@@ -1816,7 +1818,7 @@
           <a:p>
             <a:fld id="{283404FE-1ECC-4F36-AB99-D7706AB70879}" type="datetime1">
               <a:rPr lang="pt-BR" smtClean="0"/>
-              <a:t>06/11/2021</a:t>
+              <a:t>11/11/2021</a:t>
             </a:fld>
             <a:endParaRPr lang="pt-BR"/>
           </a:p>
@@ -2231,7 +2233,7 @@
           <a:p>
             <a:fld id="{0FF229CB-F570-494C-9DFC-7EBB4A5B339D}" type="datetime1">
               <a:rPr lang="pt-BR" smtClean="0"/>
-              <a:t>06/11/2021</a:t>
+              <a:t>11/11/2021</a:t>
             </a:fld>
             <a:endParaRPr lang="pt-BR"/>
           </a:p>
@@ -2375,7 +2377,7 @@
           <a:p>
             <a:fld id="{C6F08C5E-054B-4EA3-9674-4A534E902D8F}" type="datetime1">
               <a:rPr lang="pt-BR" smtClean="0"/>
-              <a:t>06/11/2021</a:t>
+              <a:t>11/11/2021</a:t>
             </a:fld>
             <a:endParaRPr lang="pt-BR"/>
           </a:p>
@@ -2491,7 +2493,7 @@
           <a:p>
             <a:fld id="{389984B9-6776-4088-80F6-64EF225C67DB}" type="datetime1">
               <a:rPr lang="pt-BR" smtClean="0"/>
-              <a:t>06/11/2021</a:t>
+              <a:t>11/11/2021</a:t>
             </a:fld>
             <a:endParaRPr lang="pt-BR"/>
           </a:p>
@@ -2805,7 +2807,7 @@
           <a:p>
             <a:fld id="{7FA5DB6D-C811-492E-BC95-40D4CE7F3018}" type="datetime1">
               <a:rPr lang="pt-BR" smtClean="0"/>
-              <a:t>06/11/2021</a:t>
+              <a:t>11/11/2021</a:t>
             </a:fld>
             <a:endParaRPr lang="pt-BR"/>
           </a:p>
@@ -3096,7 +3098,7 @@
           <a:p>
             <a:fld id="{E5392231-B61B-4087-826C-A02C05EACD70}" type="datetime1">
               <a:rPr lang="pt-BR" smtClean="0"/>
-              <a:t>06/11/2021</a:t>
+              <a:t>11/11/2021</a:t>
             </a:fld>
             <a:endParaRPr lang="pt-BR"/>
           </a:p>
@@ -3340,7 +3342,7 @@
           <a:p>
             <a:fld id="{39DC2ECC-BF16-4309-A7C9-8E5201DBE712}" type="datetime1">
               <a:rPr lang="pt-BR" smtClean="0"/>
-              <a:t>06/11/2021</a:t>
+              <a:t>11/11/2021</a:t>
             </a:fld>
             <a:endParaRPr lang="pt-BR"/>
           </a:p>
@@ -4290,8 +4292,8 @@
         </p:nvSpPr>
         <p:spPr>
           <a:xfrm>
-            <a:off x="2394012" y="270314"/>
-            <a:ext cx="7726532" cy="769441"/>
+            <a:off x="970670" y="136525"/>
+            <a:ext cx="9847385" cy="1384995"/>
           </a:xfrm>
           <a:prstGeom prst="rect">
             <a:avLst/>
@@ -4306,68 +4308,33 @@
           <a:p>
             <a:pPr algn="ctr"/>
             <a:r>
-              <a:rPr lang="en-US" sz="4400" b="1" dirty="0">
+              <a:rPr lang="en-US" sz="2800" b="1" dirty="0">
                 <a:latin typeface="Arial Black"/>
                 <a:sym typeface="Arial Black"/>
               </a:rPr>
               <a:t>PROJETO</a:t>
             </a:r>
-            <a:endParaRPr lang="pt-BR" sz="4400" dirty="0"/>
-          </a:p>
-        </p:txBody>
-      </p:sp>
-      <p:sp>
-        <p:nvSpPr>
-          <p:cNvPr id="5" name="CaixaDeTexto 4">
-            <a:extLst>
-              <a:ext uri="{FF2B5EF4-FFF2-40B4-BE49-F238E27FC236}">
-                <a16:creationId xmlns:a16="http://schemas.microsoft.com/office/drawing/2014/main" id="{CF3707E6-01AE-4D6B-B71D-116C66A72B64}"/>
-              </a:ext>
-            </a:extLst>
-          </p:cNvPr>
-          <p:cNvSpPr txBox="1"/>
-          <p:nvPr/>
-        </p:nvSpPr>
-        <p:spPr>
-          <a:xfrm>
-            <a:off x="361326" y="2312772"/>
-            <a:ext cx="5313542" cy="3336811"/>
-          </a:xfrm>
-          <a:prstGeom prst="rect">
-            <a:avLst/>
-          </a:prstGeom>
-          <a:noFill/>
-        </p:spPr>
-        <p:txBody>
-          <a:bodyPr wrap="square">
-            <a:spAutoFit/>
-          </a:bodyPr>
-          <a:lstStyle/>
-          <a:p>
-            <a:pPr algn="just">
-              <a:lnSpc>
-                <a:spcPct val="107000"/>
-              </a:lnSpc>
-              <a:spcAft>
-                <a:spcPts val="800"/>
-              </a:spcAft>
-            </a:pPr>
-            <a:r>
-              <a:rPr lang="pt-BR" sz="2200" dirty="0">
-                <a:solidFill>
-                  <a:srgbClr val="212529"/>
-                </a:solidFill>
-                <a:effectLst/>
-                <a:ea typeface="Times New Roman" panose="02020603050405020304" pitchFamily="18" charset="0"/>
-                <a:cs typeface="Times New Roman" panose="02020603050405020304" pitchFamily="18" charset="0"/>
-              </a:rPr>
-              <a:t>O projeto, teria a colaboração de vários produtores de energia fotovoltaica, também seria adicionado um incentivo governamental para proporcionar o crescimento na área. O projeto ainda contará com um sistema de software que terá como finalidade o monitoramento e análise das placas solares, esse seria gerido por uma empresa parceira do projeto.</a:t>
-            </a:r>
-            <a:endParaRPr lang="pt-BR" sz="2200" dirty="0">
-              <a:effectLst/>
-              <a:ea typeface="Calibri" panose="020F0502020204030204" pitchFamily="34" charset="0"/>
-              <a:cs typeface="Times New Roman" panose="02020603050405020304" pitchFamily="18" charset="0"/>
-            </a:endParaRPr>
+          </a:p>
+          <a:p>
+            <a:pPr algn="ctr"/>
+            <a:r>
+              <a:rPr lang="pt-BR" sz="2800" b="1" i="0" u="none" dirty="0">
+                <a:latin typeface="Arial"/>
+                <a:ea typeface="Arial"/>
+                <a:cs typeface="Arial"/>
+                <a:sym typeface="Arial"/>
+              </a:rPr>
+              <a:t>Usinas Fotovoltaicas - </a:t>
+            </a:r>
+            <a:r>
+              <a:rPr lang="pt-BR" sz="2800" b="1" dirty="0"/>
+              <a:t>Energia limpa, sustentável e acessível</a:t>
+            </a:r>
+            <a:endParaRPr lang="pt-BR" sz="3600" b="1" dirty="0"/>
+          </a:p>
+          <a:p>
+            <a:pPr algn="ctr"/>
+            <a:endParaRPr lang="pt-BR" sz="2800" dirty="0"/>
           </a:p>
         </p:txBody>
       </p:sp>
@@ -4469,8 +4436,8 @@
         </p:blipFill>
         <p:spPr bwMode="auto">
           <a:xfrm>
-            <a:off x="6279356" y="1464585"/>
-            <a:ext cx="4662487" cy="3102673"/>
+            <a:off x="6933796" y="1256111"/>
+            <a:ext cx="4287534" cy="2853159"/>
           </a:xfrm>
           <a:prstGeom prst="rect">
             <a:avLst/>
@@ -4489,10 +4456,10 @@
       </p:pic>
       <p:sp>
         <p:nvSpPr>
-          <p:cNvPr id="7" name="CaixaDeTexto 6">
-            <a:extLst>
-              <a:ext uri="{FF2B5EF4-FFF2-40B4-BE49-F238E27FC236}">
-                <a16:creationId xmlns:a16="http://schemas.microsoft.com/office/drawing/2014/main" id="{0499B026-AC6A-4C50-91D3-FE842932019A}"/>
+          <p:cNvPr id="10" name="CaixaDeTexto 9">
+            <a:extLst>
+              <a:ext uri="{FF2B5EF4-FFF2-40B4-BE49-F238E27FC236}">
+                <a16:creationId xmlns:a16="http://schemas.microsoft.com/office/drawing/2014/main" id="{4B1C4A13-D8DA-474D-96C1-815569F9D6E0}"/>
               </a:ext>
             </a:extLst>
           </p:cNvPr>
@@ -4501,8 +4468,8 @@
         </p:nvSpPr>
         <p:spPr>
           <a:xfrm>
-            <a:off x="398738" y="5686394"/>
-            <a:ext cx="6098344" cy="369332"/>
+            <a:off x="209148" y="983770"/>
+            <a:ext cx="6098344" cy="6217408"/>
           </a:xfrm>
           <a:prstGeom prst="rect">
             <a:avLst/>
@@ -4516,81 +4483,290 @@
           <a:lstStyle/>
           <a:p>
             <a:r>
-              <a:rPr lang="pt-BR" sz="1800" dirty="0">
-                <a:solidFill>
-                  <a:srgbClr val="FF0000"/>
-                </a:solidFill>
+              <a:rPr lang="pt-BR" sz="1400" dirty="0">
                 <a:ea typeface="Calibri" panose="020F0502020204030204" pitchFamily="34" charset="0"/>
                 <a:cs typeface="Times New Roman" panose="02020603050405020304" pitchFamily="18" charset="0"/>
               </a:rPr>
-              <a:t>(Acho que aqui o Sergio vai poder nos ajudar mais)</a:t>
-            </a:r>
-            <a:endParaRPr lang="pt-BR" dirty="0"/>
-          </a:p>
-        </p:txBody>
-      </p:sp>
-      <p:sp>
-        <p:nvSpPr>
-          <p:cNvPr id="9" name="CaixaDeTexto 8">
-            <a:extLst>
-              <a:ext uri="{FF2B5EF4-FFF2-40B4-BE49-F238E27FC236}">
-                <a16:creationId xmlns:a16="http://schemas.microsoft.com/office/drawing/2014/main" id="{F486EA76-638A-4E60-A9B7-B9FE71965D6E}"/>
-              </a:ext>
-            </a:extLst>
-          </p:cNvPr>
-          <p:cNvSpPr txBox="1"/>
+              <a:t>O Projeto surgiu da chamada a contribuição com os o</a:t>
+            </a:r>
+            <a:r>
+              <a:rPr lang="pt-BR" sz="1400" dirty="0">
+                <a:solidFill>
+                  <a:srgbClr val="000000"/>
+                </a:solidFill>
+                <a:effectLst/>
+                <a:ea typeface="Times New Roman" panose="02020603050405020304" pitchFamily="18" charset="0"/>
+                <a:cs typeface="Times New Roman" panose="02020603050405020304" pitchFamily="18" charset="0"/>
+              </a:rPr>
+              <a:t>bjetivos de Desenvolvimento Sustentável, Nações Unidas agenda 2030 no Brasil, apelo global à ação para acabar com a pobreza, proteger o meio ambiente e o clima e garantir que as pessoas, em todos os lugares, possam desfrutar de paz e de prosperidade. </a:t>
+            </a:r>
+          </a:p>
+          <a:p>
+            <a:endParaRPr lang="pt-BR" sz="1400" b="1" dirty="0">
+              <a:solidFill>
+                <a:srgbClr val="000000"/>
+              </a:solidFill>
+              <a:effectLst/>
+              <a:ea typeface="Times New Roman" panose="02020603050405020304" pitchFamily="18" charset="0"/>
+              <a:cs typeface="Times New Roman" panose="02020603050405020304" pitchFamily="18" charset="0"/>
+            </a:endParaRPr>
+          </a:p>
+          <a:p>
+            <a:r>
+              <a:rPr lang="pt-BR" sz="1400" b="1" dirty="0">
+                <a:solidFill>
+                  <a:srgbClr val="000000"/>
+                </a:solidFill>
+                <a:effectLst/>
+                <a:ea typeface="Times New Roman" panose="02020603050405020304" pitchFamily="18" charset="0"/>
+                <a:cs typeface="Times New Roman" panose="02020603050405020304" pitchFamily="18" charset="0"/>
+              </a:rPr>
+              <a:t>Objetivo 7. </a:t>
+            </a:r>
+            <a:r>
+              <a:rPr lang="pt-BR" sz="1400" dirty="0">
+                <a:solidFill>
+                  <a:srgbClr val="000000"/>
+                </a:solidFill>
+                <a:effectLst/>
+                <a:ea typeface="Times New Roman" panose="02020603050405020304" pitchFamily="18" charset="0"/>
+                <a:cs typeface="Times New Roman" panose="02020603050405020304" pitchFamily="18" charset="0"/>
+              </a:rPr>
+              <a:t>Assegurar o acesso confiável, sustentável, moderno e a preço acessível à energia para todas e todos.</a:t>
+            </a:r>
+          </a:p>
+          <a:p>
+            <a:pPr>
+              <a:lnSpc>
+                <a:spcPct val="107000"/>
+              </a:lnSpc>
+              <a:spcAft>
+                <a:spcPts val="800"/>
+              </a:spcAft>
+            </a:pPr>
+            <a:r>
+              <a:rPr lang="pt-BR" sz="1400" b="1" dirty="0">
+                <a:solidFill>
+                  <a:srgbClr val="000000"/>
+                </a:solidFill>
+                <a:effectLst/>
+                <a:ea typeface="Times New Roman" panose="02020603050405020304" pitchFamily="18" charset="0"/>
+                <a:cs typeface="Times New Roman" panose="02020603050405020304" pitchFamily="18" charset="0"/>
+              </a:rPr>
+              <a:t>7.1 </a:t>
+            </a:r>
+            <a:r>
+              <a:rPr lang="pt-BR" sz="1400" dirty="0">
+                <a:solidFill>
+                  <a:srgbClr val="000000"/>
+                </a:solidFill>
+                <a:effectLst/>
+                <a:ea typeface="Times New Roman" panose="02020603050405020304" pitchFamily="18" charset="0"/>
+                <a:cs typeface="Times New Roman" panose="02020603050405020304" pitchFamily="18" charset="0"/>
+              </a:rPr>
+              <a:t>Até 2030, assegurar o acesso universal, confiável, moderno e a preços acessíveis a serviços de energia.</a:t>
+            </a:r>
+          </a:p>
+          <a:p>
+            <a:pPr>
+              <a:lnSpc>
+                <a:spcPct val="107000"/>
+              </a:lnSpc>
+              <a:spcAft>
+                <a:spcPts val="800"/>
+              </a:spcAft>
+            </a:pPr>
+            <a:r>
+              <a:rPr lang="pt-BR" sz="1400" b="1" dirty="0">
+                <a:solidFill>
+                  <a:srgbClr val="000000"/>
+                </a:solidFill>
+                <a:effectLst/>
+                <a:ea typeface="Times New Roman" panose="02020603050405020304" pitchFamily="18" charset="0"/>
+                <a:cs typeface="Times New Roman" panose="02020603050405020304" pitchFamily="18" charset="0"/>
+              </a:rPr>
+              <a:t>7.2</a:t>
+            </a:r>
+            <a:r>
+              <a:rPr lang="pt-BR" sz="1400" dirty="0">
+                <a:solidFill>
+                  <a:srgbClr val="000000"/>
+                </a:solidFill>
+                <a:effectLst/>
+                <a:ea typeface="Times New Roman" panose="02020603050405020304" pitchFamily="18" charset="0"/>
+                <a:cs typeface="Times New Roman" panose="02020603050405020304" pitchFamily="18" charset="0"/>
+              </a:rPr>
+              <a:t> Até 2030, aumentar substancialmente a participação de energias renováveis na matriz energética global</a:t>
+            </a:r>
+            <a:endParaRPr lang="pt-BR" sz="1400" dirty="0">
+              <a:effectLst/>
+              <a:ea typeface="Calibri" panose="020F0502020204030204" pitchFamily="34" charset="0"/>
+              <a:cs typeface="Times New Roman" panose="02020603050405020304" pitchFamily="18" charset="0"/>
+            </a:endParaRPr>
+          </a:p>
+          <a:p>
+            <a:pPr>
+              <a:lnSpc>
+                <a:spcPct val="107000"/>
+              </a:lnSpc>
+              <a:spcAft>
+                <a:spcPts val="800"/>
+              </a:spcAft>
+            </a:pPr>
+            <a:r>
+              <a:rPr lang="pt-BR" sz="1400" b="1" dirty="0">
+                <a:solidFill>
+                  <a:srgbClr val="000000"/>
+                </a:solidFill>
+                <a:effectLst/>
+                <a:ea typeface="Times New Roman" panose="02020603050405020304" pitchFamily="18" charset="0"/>
+                <a:cs typeface="Times New Roman" panose="02020603050405020304" pitchFamily="18" charset="0"/>
+              </a:rPr>
+              <a:t>7.3</a:t>
+            </a:r>
+            <a:r>
+              <a:rPr lang="pt-BR" sz="1400" dirty="0">
+                <a:solidFill>
+                  <a:srgbClr val="000000"/>
+                </a:solidFill>
+                <a:effectLst/>
+                <a:ea typeface="Times New Roman" panose="02020603050405020304" pitchFamily="18" charset="0"/>
+                <a:cs typeface="Times New Roman" panose="02020603050405020304" pitchFamily="18" charset="0"/>
+              </a:rPr>
+              <a:t> Até 2030, dobrar a taxa global de melhoria da eficiência energética</a:t>
+            </a:r>
+            <a:endParaRPr lang="pt-BR" sz="1400" dirty="0">
+              <a:effectLst/>
+              <a:ea typeface="Calibri" panose="020F0502020204030204" pitchFamily="34" charset="0"/>
+              <a:cs typeface="Times New Roman" panose="02020603050405020304" pitchFamily="18" charset="0"/>
+            </a:endParaRPr>
+          </a:p>
+          <a:p>
+            <a:pPr>
+              <a:lnSpc>
+                <a:spcPct val="107000"/>
+              </a:lnSpc>
+              <a:spcAft>
+                <a:spcPts val="800"/>
+              </a:spcAft>
+            </a:pPr>
+            <a:r>
+              <a:rPr lang="pt-BR" sz="1400" b="1" dirty="0">
+                <a:solidFill>
+                  <a:srgbClr val="000000"/>
+                </a:solidFill>
+                <a:effectLst/>
+                <a:ea typeface="Times New Roman" panose="02020603050405020304" pitchFamily="18" charset="0"/>
+                <a:cs typeface="Times New Roman" panose="02020603050405020304" pitchFamily="18" charset="0"/>
+              </a:rPr>
+              <a:t>7.a</a:t>
+            </a:r>
+            <a:r>
+              <a:rPr lang="pt-BR" sz="1400" dirty="0">
+                <a:solidFill>
+                  <a:srgbClr val="000000"/>
+                </a:solidFill>
+                <a:effectLst/>
+                <a:ea typeface="Times New Roman" panose="02020603050405020304" pitchFamily="18" charset="0"/>
+                <a:cs typeface="Times New Roman" panose="02020603050405020304" pitchFamily="18" charset="0"/>
+              </a:rPr>
+              <a:t> Até 2030, reforçar a cooperação internacional para facilitar o acesso a pesquisa e tecnologias de energia limpa, incluindo energias renováveis, eficiência energética e tecnologias de combustíveis fósseis avançadas e mais limpas, e promover o investimento em infraestrutura de energia e em tecnologias de energia limpa</a:t>
+            </a:r>
+            <a:endParaRPr lang="pt-BR" sz="1400" dirty="0">
+              <a:effectLst/>
+              <a:ea typeface="Calibri" panose="020F0502020204030204" pitchFamily="34" charset="0"/>
+              <a:cs typeface="Times New Roman" panose="02020603050405020304" pitchFamily="18" charset="0"/>
+            </a:endParaRPr>
+          </a:p>
+          <a:p>
+            <a:pPr>
+              <a:lnSpc>
+                <a:spcPct val="107000"/>
+              </a:lnSpc>
+              <a:spcAft>
+                <a:spcPts val="800"/>
+              </a:spcAft>
+            </a:pPr>
+            <a:r>
+              <a:rPr lang="pt-BR" sz="1400" b="1" dirty="0">
+                <a:solidFill>
+                  <a:srgbClr val="000000"/>
+                </a:solidFill>
+                <a:effectLst/>
+                <a:ea typeface="Times New Roman" panose="02020603050405020304" pitchFamily="18" charset="0"/>
+                <a:cs typeface="Times New Roman" panose="02020603050405020304" pitchFamily="18" charset="0"/>
+              </a:rPr>
+              <a:t>7.b</a:t>
+            </a:r>
+            <a:r>
+              <a:rPr lang="pt-BR" sz="1400" dirty="0">
+                <a:solidFill>
+                  <a:srgbClr val="000000"/>
+                </a:solidFill>
+                <a:effectLst/>
+                <a:ea typeface="Times New Roman" panose="02020603050405020304" pitchFamily="18" charset="0"/>
+                <a:cs typeface="Times New Roman" panose="02020603050405020304" pitchFamily="18" charset="0"/>
+              </a:rPr>
+              <a:t> Até 2030, expandir a infraestrutura e modernizar a tecnologia para o fornecimento de serviços de energia modernos e sustentáveis para todos nos países em desenvolvimento, particularmente nos países menos desenvolvidos, nos pequenos Estados insulares em desenvolvimento e nos países em desenvolvimento sem litoral, de acordo com seus respectivos programas de apoio</a:t>
+            </a:r>
+            <a:endParaRPr lang="pt-BR" sz="1400" dirty="0">
+              <a:effectLst/>
+              <a:ea typeface="Calibri" panose="020F0502020204030204" pitchFamily="34" charset="0"/>
+              <a:cs typeface="Times New Roman" panose="02020603050405020304" pitchFamily="18" charset="0"/>
+            </a:endParaRPr>
+          </a:p>
+          <a:p>
+            <a:endParaRPr lang="pt-BR" sz="1400" dirty="0">
+              <a:effectLst/>
+              <a:ea typeface="Calibri" panose="020F0502020204030204" pitchFamily="34" charset="0"/>
+              <a:cs typeface="Times New Roman" panose="02020603050405020304" pitchFamily="18" charset="0"/>
+            </a:endParaRPr>
+          </a:p>
+          <a:p>
+            <a:r>
+              <a:rPr lang="pt-BR" sz="1400" dirty="0">
+                <a:solidFill>
+                  <a:srgbClr val="FF0000"/>
+                </a:solidFill>
+                <a:ea typeface="Calibri" panose="020F0502020204030204" pitchFamily="34" charset="0"/>
+                <a:cs typeface="Times New Roman" panose="02020603050405020304" pitchFamily="18" charset="0"/>
+              </a:rPr>
+              <a:t> </a:t>
+            </a:r>
+            <a:endParaRPr lang="pt-BR" sz="1400" dirty="0"/>
+          </a:p>
+        </p:txBody>
+      </p:sp>
+      <p:pic>
+        <p:nvPicPr>
+          <p:cNvPr id="4" name="Imagem 3">
+            <a:extLst>
+              <a:ext uri="{FF2B5EF4-FFF2-40B4-BE49-F238E27FC236}">
+                <a16:creationId xmlns:a16="http://schemas.microsoft.com/office/drawing/2014/main" id="{99A16BD4-A6FE-41B8-AA02-9ACE3EF00C00}"/>
+              </a:ext>
+            </a:extLst>
+          </p:cNvPr>
+          <p:cNvPicPr>
+            <a:picLocks noChangeAspect="1"/>
+          </p:cNvPicPr>
           <p:nvPr/>
-        </p:nvSpPr>
+        </p:nvPicPr>
+        <p:blipFill>
+          <a:blip r:embed="rId3"/>
+          <a:stretch>
+            <a:fillRect/>
+          </a:stretch>
+        </p:blipFill>
         <p:spPr>
           <a:xfrm>
-            <a:off x="158934" y="925093"/>
-            <a:ext cx="6098344" cy="1200329"/>
+            <a:off x="6933796" y="4109270"/>
+            <a:ext cx="4318301" cy="2247080"/>
           </a:xfrm>
           <a:prstGeom prst="rect">
             <a:avLst/>
           </a:prstGeom>
-          <a:noFill/>
         </p:spPr>
-        <p:txBody>
-          <a:bodyPr wrap="square">
-            <a:spAutoFit/>
-          </a:bodyPr>
-          <a:lstStyle/>
-          <a:p>
-            <a:r>
-              <a:rPr lang="pt-BR" dirty="0">
-                <a:solidFill>
-                  <a:srgbClr val="FF0000"/>
-                </a:solidFill>
-                <a:ea typeface="Calibri" panose="020F0502020204030204" pitchFamily="34" charset="0"/>
-                <a:cs typeface="Times New Roman" panose="02020603050405020304" pitchFamily="18" charset="0"/>
-              </a:rPr>
-              <a:t>(A meu ver, depois da conversa com o professor nosso problema não é mais mostrar os benefícios da fotovoltaica e sim, </a:t>
-            </a:r>
-            <a:r>
-              <a:rPr lang="pt-BR" b="1" dirty="0">
-                <a:solidFill>
-                  <a:srgbClr val="FF0000"/>
-                </a:solidFill>
-                <a:ea typeface="Calibri" panose="020F0502020204030204" pitchFamily="34" charset="0"/>
-                <a:cs typeface="Times New Roman" panose="02020603050405020304" pitchFamily="18" charset="0"/>
-              </a:rPr>
-              <a:t>sugerir uma proposta factível para que o governo de incentivo.) </a:t>
-            </a:r>
-            <a:r>
-              <a:rPr lang="pt-BR" dirty="0">
-                <a:solidFill>
-                  <a:srgbClr val="FF0000"/>
-                </a:solidFill>
-                <a:ea typeface="Calibri" panose="020F0502020204030204" pitchFamily="34" charset="0"/>
-                <a:cs typeface="Times New Roman" panose="02020603050405020304" pitchFamily="18" charset="0"/>
-              </a:rPr>
-              <a:t>Posso estar enganado?</a:t>
-            </a:r>
-            <a:endParaRPr lang="pt-BR" dirty="0"/>
-          </a:p>
-        </p:txBody>
-      </p:sp>
+      </p:pic>
     </p:spTree>
     <p:extLst>
       <p:ext uri="{BB962C8B-B14F-4D97-AF65-F5344CB8AC3E}">
@@ -4623,10 +4799,216 @@
       </p:grpSpPr>
       <p:sp>
         <p:nvSpPr>
-          <p:cNvPr id="3" name="CaixaDeTexto 2">
-            <a:extLst>
-              <a:ext uri="{FF2B5EF4-FFF2-40B4-BE49-F238E27FC236}">
-                <a16:creationId xmlns:a16="http://schemas.microsoft.com/office/drawing/2014/main" id="{C4E4B2FD-EA94-46F9-8957-15BE8504D9BB}"/>
+          <p:cNvPr id="4" name="Espaço Reservado para Rodapé 3">
+            <a:extLst>
+              <a:ext uri="{FF2B5EF4-FFF2-40B4-BE49-F238E27FC236}">
+                <a16:creationId xmlns:a16="http://schemas.microsoft.com/office/drawing/2014/main" id="{896863A0-8A15-439F-BC54-F1EEA19E814F}"/>
+              </a:ext>
+            </a:extLst>
+          </p:cNvPr>
+          <p:cNvSpPr>
+            <a:spLocks noGrp="1"/>
+          </p:cNvSpPr>
+          <p:nvPr>
+            <p:ph type="ftr" sz="quarter" idx="11"/>
+          </p:nvPr>
+        </p:nvSpPr>
+        <p:spPr/>
+        <p:txBody>
+          <a:bodyPr/>
+          <a:lstStyle/>
+          <a:p>
+            <a:r>
+              <a:rPr lang="pt-BR"/>
+              <a:t>Grupo Eco Energy</a:t>
+            </a:r>
+          </a:p>
+        </p:txBody>
+      </p:sp>
+      <p:sp>
+        <p:nvSpPr>
+          <p:cNvPr id="5" name="Espaço Reservado para Número de Slide 4">
+            <a:extLst>
+              <a:ext uri="{FF2B5EF4-FFF2-40B4-BE49-F238E27FC236}">
+                <a16:creationId xmlns:a16="http://schemas.microsoft.com/office/drawing/2014/main" id="{8FE96E99-CD7F-4012-82B4-6582DB0ED211}"/>
+              </a:ext>
+            </a:extLst>
+          </p:cNvPr>
+          <p:cNvSpPr>
+            <a:spLocks noGrp="1"/>
+          </p:cNvSpPr>
+          <p:nvPr>
+            <p:ph type="sldNum" sz="quarter" idx="12"/>
+          </p:nvPr>
+        </p:nvSpPr>
+        <p:spPr/>
+        <p:txBody>
+          <a:bodyPr/>
+          <a:lstStyle/>
+          <a:p>
+            <a:fld id="{24F432EC-2972-46C7-97C1-1EB75B8CBA8A}" type="slidenum">
+              <a:rPr lang="pt-BR" smtClean="0"/>
+              <a:t>12</a:t>
+            </a:fld>
+            <a:endParaRPr lang="pt-BR"/>
+          </a:p>
+        </p:txBody>
+      </p:sp>
+      <p:sp>
+        <p:nvSpPr>
+          <p:cNvPr id="7" name="CaixaDeTexto 6">
+            <a:extLst>
+              <a:ext uri="{FF2B5EF4-FFF2-40B4-BE49-F238E27FC236}">
+                <a16:creationId xmlns:a16="http://schemas.microsoft.com/office/drawing/2014/main" id="{4FE70F3F-7356-4DF6-89B7-879A47CE0E41}"/>
+              </a:ext>
+            </a:extLst>
+          </p:cNvPr>
+          <p:cNvSpPr txBox="1"/>
+          <p:nvPr/>
+        </p:nvSpPr>
+        <p:spPr>
+          <a:xfrm>
+            <a:off x="760828" y="1039755"/>
+            <a:ext cx="6098344" cy="5622437"/>
+          </a:xfrm>
+          <a:prstGeom prst="rect">
+            <a:avLst/>
+          </a:prstGeom>
+          <a:noFill/>
+        </p:spPr>
+        <p:txBody>
+          <a:bodyPr wrap="square">
+            <a:spAutoFit/>
+          </a:bodyPr>
+          <a:lstStyle/>
+          <a:p>
+            <a:pPr marL="342900" lvl="0" indent="-342900" algn="just">
+              <a:lnSpc>
+                <a:spcPct val="107000"/>
+              </a:lnSpc>
+              <a:spcAft>
+                <a:spcPts val="800"/>
+              </a:spcAft>
+              <a:buFont typeface="+mj-lt"/>
+              <a:buAutoNum type="arabicParenR"/>
+              <a:tabLst>
+                <a:tab pos="457200" algn="l"/>
+              </a:tabLst>
+            </a:pPr>
+            <a:r>
+              <a:rPr lang="pt-BR" sz="2400" dirty="0">
+                <a:effectLst/>
+                <a:latin typeface="Calibri" panose="020F0502020204030204" pitchFamily="34" charset="0"/>
+                <a:ea typeface="Calibri" panose="020F0502020204030204" pitchFamily="34" charset="0"/>
+                <a:cs typeface="Times New Roman" panose="02020603050405020304" pitchFamily="18" charset="0"/>
+              </a:rPr>
+              <a:t>Abertura ao crédito com taxas especiais para aquisição das usinas fotovoltaicas;</a:t>
+            </a:r>
+          </a:p>
+          <a:p>
+            <a:pPr marL="342900" lvl="0" indent="-342900" algn="just">
+              <a:lnSpc>
+                <a:spcPct val="107000"/>
+              </a:lnSpc>
+              <a:spcAft>
+                <a:spcPts val="800"/>
+              </a:spcAft>
+              <a:buFont typeface="+mj-lt"/>
+              <a:buAutoNum type="arabicParenR"/>
+              <a:tabLst>
+                <a:tab pos="457200" algn="l"/>
+              </a:tabLst>
+            </a:pPr>
+            <a:r>
+              <a:rPr lang="pt-BR" sz="2400" dirty="0">
+                <a:effectLst/>
+                <a:latin typeface="Calibri" panose="020F0502020204030204" pitchFamily="34" charset="0"/>
+                <a:ea typeface="Calibri" panose="020F0502020204030204" pitchFamily="34" charset="0"/>
+                <a:cs typeface="Times New Roman" panose="02020603050405020304" pitchFamily="18" charset="0"/>
+              </a:rPr>
+              <a:t>Incentivo fiscal nas gerações e aquisição das gerações excedentes;</a:t>
+            </a:r>
+          </a:p>
+          <a:p>
+            <a:pPr marL="342900" lvl="0" indent="-342900" algn="just">
+              <a:lnSpc>
+                <a:spcPct val="107000"/>
+              </a:lnSpc>
+              <a:spcAft>
+                <a:spcPts val="800"/>
+              </a:spcAft>
+              <a:buFont typeface="+mj-lt"/>
+              <a:buAutoNum type="arabicParenR"/>
+              <a:tabLst>
+                <a:tab pos="457200" algn="l"/>
+              </a:tabLst>
+            </a:pPr>
+            <a:r>
+              <a:rPr lang="pt-BR" sz="2400" dirty="0">
+                <a:effectLst/>
+                <a:latin typeface="Calibri" panose="020F0502020204030204" pitchFamily="34" charset="0"/>
+                <a:ea typeface="Calibri" panose="020F0502020204030204" pitchFamily="34" charset="0"/>
+                <a:cs typeface="Times New Roman" panose="02020603050405020304" pitchFamily="18" charset="0"/>
+              </a:rPr>
+              <a:t>Garantia de compra do excedente ou repasse a terceiro;</a:t>
+            </a:r>
+          </a:p>
+          <a:p>
+            <a:pPr marL="342900" lvl="0" indent="-342900" algn="just">
+              <a:lnSpc>
+                <a:spcPct val="107000"/>
+              </a:lnSpc>
+              <a:spcAft>
+                <a:spcPts val="800"/>
+              </a:spcAft>
+              <a:buFont typeface="+mj-lt"/>
+              <a:buAutoNum type="arabicParenR"/>
+              <a:tabLst>
+                <a:tab pos="457200" algn="l"/>
+              </a:tabLst>
+            </a:pPr>
+            <a:r>
+              <a:rPr lang="pt-BR" sz="2400" dirty="0">
+                <a:effectLst/>
+                <a:latin typeface="Calibri" panose="020F0502020204030204" pitchFamily="34" charset="0"/>
+                <a:ea typeface="Calibri" panose="020F0502020204030204" pitchFamily="34" charset="0"/>
+                <a:cs typeface="Times New Roman" panose="02020603050405020304" pitchFamily="18" charset="0"/>
+              </a:rPr>
+              <a:t>Embargo e Redirecionamento de verbas e projetos APROVADOS para criação de outros meios de geração de energia que não seja FOTOVOLTAICAS. </a:t>
+            </a:r>
+          </a:p>
+          <a:p>
+            <a:pPr marL="342900" lvl="0" indent="-342900" algn="just">
+              <a:lnSpc>
+                <a:spcPct val="107000"/>
+              </a:lnSpc>
+              <a:spcAft>
+                <a:spcPts val="800"/>
+              </a:spcAft>
+              <a:buFont typeface="+mj-lt"/>
+              <a:buAutoNum type="arabicParenR"/>
+              <a:tabLst>
+                <a:tab pos="457200" algn="l"/>
+              </a:tabLst>
+            </a:pPr>
+            <a:r>
+              <a:rPr lang="pt-BR" sz="2400" dirty="0">
+                <a:effectLst/>
+                <a:latin typeface="Calibri" panose="020F0502020204030204" pitchFamily="34" charset="0"/>
+                <a:ea typeface="Calibri" panose="020F0502020204030204" pitchFamily="34" charset="0"/>
+                <a:cs typeface="Times New Roman" panose="02020603050405020304" pitchFamily="18" charset="0"/>
+              </a:rPr>
+              <a:t>Estudos de Engajamento/migração das distribuidoras de energia, á implementação das Usinas FOTOVOLTAICAS.</a:t>
+            </a:r>
+          </a:p>
+        </p:txBody>
+      </p:sp>
+      <p:sp>
+        <p:nvSpPr>
+          <p:cNvPr id="8" name="CaixaDeTexto 7">
+            <a:extLst>
+              <a:ext uri="{FF2B5EF4-FFF2-40B4-BE49-F238E27FC236}">
+                <a16:creationId xmlns:a16="http://schemas.microsoft.com/office/drawing/2014/main" id="{0FEE3D4D-8F3D-4E83-84BD-6B1E9D8B3052}"/>
               </a:ext>
             </a:extLst>
           </p:cNvPr>
@@ -4655,83 +5037,18 @@
                 <a:latin typeface="Arial Black"/>
                 <a:sym typeface="Arial Black"/>
               </a:rPr>
-              <a:t>SOLUÇÃO E CONCLUSÃO</a:t>
+              <a:t>SOLUÇÃO</a:t>
             </a:r>
             <a:endParaRPr lang="pt-BR" sz="4400" dirty="0"/>
-          </a:p>
-        </p:txBody>
-      </p:sp>
-      <p:sp>
-        <p:nvSpPr>
-          <p:cNvPr id="5" name="CaixaDeTexto 4">
-            <a:extLst>
-              <a:ext uri="{FF2B5EF4-FFF2-40B4-BE49-F238E27FC236}">
-                <a16:creationId xmlns:a16="http://schemas.microsoft.com/office/drawing/2014/main" id="{CF3707E6-01AE-4D6B-B71D-116C66A72B64}"/>
-              </a:ext>
-            </a:extLst>
-          </p:cNvPr>
-          <p:cNvSpPr txBox="1"/>
-          <p:nvPr/>
-        </p:nvSpPr>
-        <p:spPr>
-          <a:xfrm>
-            <a:off x="621180" y="1347517"/>
-            <a:ext cx="5313542" cy="3336811"/>
-          </a:xfrm>
-          <a:prstGeom prst="rect">
-            <a:avLst/>
-          </a:prstGeom>
-          <a:noFill/>
-        </p:spPr>
-        <p:txBody>
-          <a:bodyPr wrap="square">
-            <a:spAutoFit/>
-          </a:bodyPr>
-          <a:lstStyle/>
-          <a:p>
-            <a:pPr algn="just">
-              <a:lnSpc>
-                <a:spcPct val="107000"/>
-              </a:lnSpc>
-              <a:spcAft>
-                <a:spcPts val="800"/>
-              </a:spcAft>
-            </a:pPr>
-            <a:r>
-              <a:rPr lang="pt-BR" sz="2200" dirty="0">
-                <a:solidFill>
-                  <a:srgbClr val="212529"/>
-                </a:solidFill>
-                <a:effectLst/>
-                <a:ea typeface="Times New Roman" panose="02020603050405020304" pitchFamily="18" charset="0"/>
-                <a:cs typeface="Times New Roman" panose="02020603050405020304" pitchFamily="18" charset="0"/>
-              </a:rPr>
-              <a:t>Dessa forma, foi idealizado uma solução para viabilizar o acesso e expansão da energia fotovoltaica que é uma energia limpa e sustentável, englobando pequenos produtores de energia, havendo o incentivo a economia, além de gerar empregos e estimular o mercado em áreas com maior incidência de raios solares, pri</a:t>
-            </a:r>
-            <a:r>
-              <a:rPr lang="pt-BR" sz="2200" dirty="0">
-                <a:solidFill>
-                  <a:srgbClr val="212529"/>
-                </a:solidFill>
-                <a:ea typeface="Times New Roman" panose="02020603050405020304" pitchFamily="18" charset="0"/>
-                <a:cs typeface="Times New Roman" panose="02020603050405020304" pitchFamily="18" charset="0"/>
-              </a:rPr>
-              <a:t>ncipalmente em regiões como nordeste.</a:t>
-            </a:r>
-            <a:endParaRPr lang="pt-BR" sz="2200" dirty="0">
-              <a:effectLst/>
-              <a:ea typeface="Calibri" panose="020F0502020204030204" pitchFamily="34" charset="0"/>
-              <a:cs typeface="Times New Roman" panose="02020603050405020304" pitchFamily="18" charset="0"/>
-            </a:endParaRPr>
           </a:p>
         </p:txBody>
       </p:sp>
       <p:pic>
         <p:nvPicPr>
-          <p:cNvPr id="7" name="Imagem 6">
-            <a:extLst>
-              <a:ext uri="{FF2B5EF4-FFF2-40B4-BE49-F238E27FC236}">
-                <a16:creationId xmlns:a16="http://schemas.microsoft.com/office/drawing/2014/main" id="{B7DDB4DA-E023-47DE-9BE2-7468C8EC3BE8}"/>
+          <p:cNvPr id="9" name="Imagem 8">
+            <a:extLst>
+              <a:ext uri="{FF2B5EF4-FFF2-40B4-BE49-F238E27FC236}">
+                <a16:creationId xmlns:a16="http://schemas.microsoft.com/office/drawing/2014/main" id="{01EDC4FC-4237-483A-A7D0-F512EEFBCC63}"/>
               </a:ext>
             </a:extLst>
           </p:cNvPr>
@@ -4754,7 +5071,7 @@
         </p:blipFill>
         <p:spPr>
           <a:xfrm>
-            <a:off x="6257278" y="1347517"/>
+            <a:off x="7203558" y="1546085"/>
             <a:ext cx="4312022" cy="2262744"/>
           </a:xfrm>
           <a:prstGeom prst="rect">
@@ -4764,10 +5081,10 @@
       </p:pic>
       <p:pic>
         <p:nvPicPr>
-          <p:cNvPr id="9" name="Imagem 8">
-            <a:extLst>
-              <a:ext uri="{FF2B5EF4-FFF2-40B4-BE49-F238E27FC236}">
-                <a16:creationId xmlns:a16="http://schemas.microsoft.com/office/drawing/2014/main" id="{77EA053C-E99B-47A9-BFA0-8CB962AD1376}"/>
+          <p:cNvPr id="10" name="Imagem 9">
+            <a:extLst>
+              <a:ext uri="{FF2B5EF4-FFF2-40B4-BE49-F238E27FC236}">
+                <a16:creationId xmlns:a16="http://schemas.microsoft.com/office/drawing/2014/main" id="{AF971F7C-80E9-4304-BE07-EF507E29FB69}"/>
               </a:ext>
             </a:extLst>
           </p:cNvPr>
@@ -4790,7 +5107,7 @@
         </p:blipFill>
         <p:spPr>
           <a:xfrm>
-            <a:off x="6257279" y="3593575"/>
+            <a:off x="7203559" y="3808829"/>
             <a:ext cx="4312021" cy="2455013"/>
           </a:xfrm>
           <a:prstGeom prst="rect">
@@ -4798,12 +5115,42 @@
           </a:prstGeom>
         </p:spPr>
       </p:pic>
-      <p:sp>
-        <p:nvSpPr>
-          <p:cNvPr id="6" name="Espaço Reservado para Rodapé 5">
-            <a:extLst>
-              <a:ext uri="{FF2B5EF4-FFF2-40B4-BE49-F238E27FC236}">
-                <a16:creationId xmlns:a16="http://schemas.microsoft.com/office/drawing/2014/main" id="{88955371-7B1B-4F45-8E0F-2D8778641381}"/>
+    </p:spTree>
+    <p:extLst>
+      <p:ext uri="{BB962C8B-B14F-4D97-AF65-F5344CB8AC3E}">
+        <p14:creationId xmlns:p14="http://schemas.microsoft.com/office/powerpoint/2010/main" val="1630368617"/>
+      </p:ext>
+    </p:extLst>
+  </p:cSld>
+  <p:clrMapOvr>
+    <a:masterClrMapping/>
+  </p:clrMapOvr>
+</p:sld>
+</file>
+
+<file path=ppt/slides/slide13.xml><?xml version="1.0" encoding="utf-8"?>
+<p:sld xmlns:a="http://schemas.openxmlformats.org/drawingml/2006/main" xmlns:r="http://schemas.openxmlformats.org/officeDocument/2006/relationships" xmlns:p="http://schemas.openxmlformats.org/presentationml/2006/main">
+  <p:cSld>
+    <p:spTree>
+      <p:nvGrpSpPr>
+        <p:cNvPr id="1" name=""/>
+        <p:cNvGrpSpPr/>
+        <p:nvPr/>
+      </p:nvGrpSpPr>
+      <p:grpSpPr>
+        <a:xfrm>
+          <a:off x="0" y="0"/>
+          <a:ext cx="0" cy="0"/>
+          <a:chOff x="0" y="0"/>
+          <a:chExt cx="0" cy="0"/>
+        </a:xfrm>
+      </p:grpSpPr>
+      <p:sp>
+        <p:nvSpPr>
+          <p:cNvPr id="4" name="Espaço Reservado para Rodapé 3">
+            <a:extLst>
+              <a:ext uri="{FF2B5EF4-FFF2-40B4-BE49-F238E27FC236}">
+                <a16:creationId xmlns:a16="http://schemas.microsoft.com/office/drawing/2014/main" id="{896863A0-8A15-439F-BC54-F1EEA19E814F}"/>
               </a:ext>
             </a:extLst>
           </p:cNvPr>
@@ -4820,22 +5167,18 @@
           <a:lstStyle/>
           <a:p>
             <a:r>
-              <a:rPr lang="pt-BR" sz="1600" dirty="0">
-                <a:solidFill>
-                  <a:schemeClr val="tx1"/>
-                </a:solidFill>
-              </a:rPr>
-              <a:t>Grupo Eco Energy-21</a:t>
-            </a:r>
-          </a:p>
-        </p:txBody>
-      </p:sp>
-      <p:sp>
-        <p:nvSpPr>
-          <p:cNvPr id="8" name="Espaço Reservado para Número de Slide 7">
-            <a:extLst>
-              <a:ext uri="{FF2B5EF4-FFF2-40B4-BE49-F238E27FC236}">
-                <a16:creationId xmlns:a16="http://schemas.microsoft.com/office/drawing/2014/main" id="{273E7CE3-7453-4B12-99B7-327A5F637046}"/>
+              <a:rPr lang="pt-BR"/>
+              <a:t>Grupo Eco Energy</a:t>
+            </a:r>
+          </a:p>
+        </p:txBody>
+      </p:sp>
+      <p:sp>
+        <p:nvSpPr>
+          <p:cNvPr id="5" name="Espaço Reservado para Número de Slide 4">
+            <a:extLst>
+              <a:ext uri="{FF2B5EF4-FFF2-40B4-BE49-F238E27FC236}">
+                <a16:creationId xmlns:a16="http://schemas.microsoft.com/office/drawing/2014/main" id="{8FE96E99-CD7F-4012-82B4-6582DB0ED211}"/>
               </a:ext>
             </a:extLst>
           </p:cNvPr>
@@ -4852,27 +5195,19 @@
           <a:lstStyle/>
           <a:p>
             <a:fld id="{24F432EC-2972-46C7-97C1-1EB75B8CBA8A}" type="slidenum">
-              <a:rPr lang="pt-BR" sz="2500" smtClean="0">
-                <a:solidFill>
-                  <a:schemeClr val="tx1"/>
-                </a:solidFill>
-              </a:rPr>
-              <a:t>12</a:t>
+              <a:rPr lang="pt-BR" smtClean="0"/>
+              <a:t>13</a:t>
             </a:fld>
-            <a:endParaRPr lang="pt-BR" sz="2500" dirty="0">
-              <a:solidFill>
-                <a:schemeClr val="tx1"/>
-              </a:solidFill>
-            </a:endParaRPr>
-          </a:p>
-        </p:txBody>
-      </p:sp>
-      <p:sp>
-        <p:nvSpPr>
-          <p:cNvPr id="10" name="CaixaDeTexto 9">
-            <a:extLst>
-              <a:ext uri="{FF2B5EF4-FFF2-40B4-BE49-F238E27FC236}">
-                <a16:creationId xmlns:a16="http://schemas.microsoft.com/office/drawing/2014/main" id="{4838D769-0300-43CE-969F-4BFA24D0CF57}"/>
+            <a:endParaRPr lang="pt-BR"/>
+          </a:p>
+        </p:txBody>
+      </p:sp>
+      <p:sp>
+        <p:nvSpPr>
+          <p:cNvPr id="8" name="CaixaDeTexto 7">
+            <a:extLst>
+              <a:ext uri="{FF2B5EF4-FFF2-40B4-BE49-F238E27FC236}">
+                <a16:creationId xmlns:a16="http://schemas.microsoft.com/office/drawing/2014/main" id="{0FEE3D4D-8F3D-4E83-84BD-6B1E9D8B3052}"/>
               </a:ext>
             </a:extLst>
           </p:cNvPr>
@@ -4881,8 +5216,8 @@
         </p:nvSpPr>
         <p:spPr>
           <a:xfrm>
-            <a:off x="398738" y="5686394"/>
-            <a:ext cx="6098344" cy="369332"/>
+            <a:off x="2027583" y="270314"/>
+            <a:ext cx="8092961" cy="769441"/>
           </a:xfrm>
           <a:prstGeom prst="rect">
             <a:avLst/>
@@ -4895,24 +5230,94 @@
           </a:bodyPr>
           <a:lstStyle/>
           <a:p>
-            <a:r>
-              <a:rPr lang="pt-BR" sz="1800" dirty="0">
-                <a:solidFill>
-                  <a:srgbClr val="FF0000"/>
-                </a:solidFill>
-                <a:ea typeface="Calibri" panose="020F0502020204030204" pitchFamily="34" charset="0"/>
-                <a:cs typeface="Times New Roman" panose="02020603050405020304" pitchFamily="18" charset="0"/>
-              </a:rPr>
-              <a:t>(Acho que aqui o Sergio vai poder nos ajudar mais)</a:t>
-            </a:r>
-            <a:endParaRPr lang="pt-BR" dirty="0"/>
-          </a:p>
-        </p:txBody>
-      </p:sp>
+            <a:pPr algn="ctr"/>
+            <a:r>
+              <a:rPr lang="en-US" sz="4400" b="1" dirty="0">
+                <a:latin typeface="Arial Black"/>
+                <a:sym typeface="Arial Black"/>
+              </a:rPr>
+              <a:t>CONCLUSÃO</a:t>
+            </a:r>
+            <a:endParaRPr lang="pt-BR" sz="4400" dirty="0"/>
+          </a:p>
+        </p:txBody>
+      </p:sp>
+      <p:pic>
+        <p:nvPicPr>
+          <p:cNvPr id="9" name="Imagem 8">
+            <a:extLst>
+              <a:ext uri="{FF2B5EF4-FFF2-40B4-BE49-F238E27FC236}">
+                <a16:creationId xmlns:a16="http://schemas.microsoft.com/office/drawing/2014/main" id="{01EDC4FC-4237-483A-A7D0-F512EEFBCC63}"/>
+              </a:ext>
+            </a:extLst>
+          </p:cNvPr>
+          <p:cNvPicPr>
+            <a:picLocks noChangeAspect="1"/>
+          </p:cNvPicPr>
+          <p:nvPr/>
+        </p:nvPicPr>
+        <p:blipFill>
+          <a:blip r:embed="rId2">
+            <a:extLst>
+              <a:ext uri="{28A0092B-C50C-407E-A947-70E740481C1C}">
+                <a14:useLocalDpi xmlns:a14="http://schemas.microsoft.com/office/drawing/2010/main" val="0"/>
+              </a:ext>
+            </a:extLst>
+          </a:blip>
+          <a:stretch>
+            <a:fillRect/>
+          </a:stretch>
+        </p:blipFill>
+        <p:spPr>
+          <a:xfrm>
+            <a:off x="7203558" y="1546085"/>
+            <a:ext cx="4312022" cy="2262744"/>
+          </a:xfrm>
+          <a:prstGeom prst="rect">
+            <a:avLst/>
+          </a:prstGeom>
+        </p:spPr>
+      </p:pic>
+      <p:pic>
+        <p:nvPicPr>
+          <p:cNvPr id="10" name="Imagem 9">
+            <a:extLst>
+              <a:ext uri="{FF2B5EF4-FFF2-40B4-BE49-F238E27FC236}">
+                <a16:creationId xmlns:a16="http://schemas.microsoft.com/office/drawing/2014/main" id="{AF971F7C-80E9-4304-BE07-EF507E29FB69}"/>
+              </a:ext>
+            </a:extLst>
+          </p:cNvPr>
+          <p:cNvPicPr>
+            <a:picLocks noChangeAspect="1"/>
+          </p:cNvPicPr>
+          <p:nvPr/>
+        </p:nvPicPr>
+        <p:blipFill>
+          <a:blip r:embed="rId3">
+            <a:extLst>
+              <a:ext uri="{28A0092B-C50C-407E-A947-70E740481C1C}">
+                <a14:useLocalDpi xmlns:a14="http://schemas.microsoft.com/office/drawing/2010/main" val="0"/>
+              </a:ext>
+            </a:extLst>
+          </a:blip>
+          <a:stretch>
+            <a:fillRect/>
+          </a:stretch>
+        </p:blipFill>
+        <p:spPr>
+          <a:xfrm>
+            <a:off x="7203559" y="3808829"/>
+            <a:ext cx="4312021" cy="2455013"/>
+          </a:xfrm>
+          <a:prstGeom prst="rect">
+            <a:avLst/>
+          </a:prstGeom>
+        </p:spPr>
+      </p:pic>
     </p:spTree>
     <p:extLst>
       <p:ext uri="{BB962C8B-B14F-4D97-AF65-F5344CB8AC3E}">
-        <p14:creationId xmlns:p14="http://schemas.microsoft.com/office/powerpoint/2010/main" val="3143427520"/>
+        <p14:creationId xmlns:p14="http://schemas.microsoft.com/office/powerpoint/2010/main" val="2929560172"/>
       </p:ext>
     </p:extLst>
   </p:cSld>
@@ -5138,8 +5543,8 @@
         </p:nvSpPr>
         <p:spPr>
           <a:xfrm>
-            <a:off x="710213" y="1221444"/>
-            <a:ext cx="5889369" cy="5170390"/>
+            <a:off x="710213" y="1277716"/>
+            <a:ext cx="5889369" cy="4851841"/>
           </a:xfrm>
           <a:prstGeom prst="rect">
             <a:avLst/>
@@ -5179,26 +5584,6 @@
               </a:rPr>
               <a:t>:</a:t>
             </a:r>
-          </a:p>
-          <a:p>
-            <a:pPr marL="88900" lvl="0" algn="l" rtl="0">
-              <a:lnSpc>
-                <a:spcPct val="115000"/>
-              </a:lnSpc>
-              <a:spcBef>
-                <a:spcPts val="0"/>
-              </a:spcBef>
-              <a:spcAft>
-                <a:spcPts val="0"/>
-              </a:spcAft>
-              <a:buClr>
-                <a:srgbClr val="000000"/>
-              </a:buClr>
-              <a:buSzPts val="400"/>
-            </a:pPr>
-            <a:endParaRPr lang="pt-BR" dirty="0">
-              <a:cs typeface="Arial" panose="020B0604020202020204" pitchFamily="34" charset="0"/>
-            </a:endParaRPr>
           </a:p>
           <a:p>
             <a:pPr marL="88900" lvl="0" algn="just" rtl="0">
@@ -5399,7 +5784,7 @@
         </p:nvSpPr>
         <p:spPr>
           <a:xfrm>
-            <a:off x="1245834" y="304800"/>
+            <a:off x="1245834" y="212036"/>
             <a:ext cx="10204882" cy="1431925"/>
           </a:xfrm>
           <a:prstGeom prst="rect">
@@ -5504,7 +5889,7 @@
               <a:buNone/>
             </a:pPr>
             <a:r>
-              <a:rPr lang="en-US" sz="4400" dirty="0">
+              <a:rPr lang="en-US" sz="4000" dirty="0">
                 <a:latin typeface="Arial Black" panose="020B0A04020102020204" pitchFamily="34" charset="0"/>
               </a:rPr>
               <a:t>O QUE TEMOS HOJE?</a:t>
@@ -5523,7 +5908,7 @@
               <a:buNone/>
             </a:pPr>
             <a:r>
-              <a:rPr lang="en-US" sz="4400" dirty="0">
+              <a:rPr lang="en-US" sz="4000" dirty="0">
                 <a:latin typeface="Arial Black" panose="020B0A04020102020204" pitchFamily="34" charset="0"/>
               </a:rPr>
               <a:t>HIDRELETRICAS</a:t>
@@ -5647,7 +6032,7 @@
         </p:nvSpPr>
         <p:spPr>
           <a:xfrm>
-            <a:off x="703848" y="1468511"/>
+            <a:off x="741284" y="1643961"/>
             <a:ext cx="4994587" cy="4801314"/>
           </a:xfrm>
           <a:prstGeom prst="rect">
@@ -6132,7 +6517,7 @@
         </p:nvSpPr>
         <p:spPr>
           <a:xfrm>
-            <a:off x="1245834" y="304800"/>
+            <a:off x="1245834" y="66264"/>
             <a:ext cx="10204882" cy="1431925"/>
           </a:xfrm>
           <a:prstGeom prst="rect">
@@ -6256,11 +6641,14 @@
               <a:buNone/>
             </a:pPr>
             <a:r>
-              <a:rPr lang="en-US" sz="4400" dirty="0">
+              <a:rPr lang="en-US" sz="4000" dirty="0">
                 <a:latin typeface="Arial Black" panose="020B0A04020102020204" pitchFamily="34" charset="0"/>
               </a:rPr>
               <a:t>TERMELETRICAS</a:t>
             </a:r>
+            <a:endParaRPr lang="en-US" sz="4400" dirty="0">
+              <a:latin typeface="Arial Black" panose="020B0A04020102020204" pitchFamily="34" charset="0"/>
+            </a:endParaRPr>
           </a:p>
         </p:txBody>
       </p:sp>
@@ -6351,12 +6739,282 @@
           </a:p>
         </p:txBody>
       </p:sp>
+      <p:sp>
+        <p:nvSpPr>
+          <p:cNvPr id="10" name="CaixaDeTexto 9">
+            <a:extLst>
+              <a:ext uri="{FF2B5EF4-FFF2-40B4-BE49-F238E27FC236}">
+                <a16:creationId xmlns:a16="http://schemas.microsoft.com/office/drawing/2014/main" id="{EF4D8725-EFF2-4DDF-81D3-43F8A3B997A1}"/>
+              </a:ext>
+            </a:extLst>
+          </p:cNvPr>
+          <p:cNvSpPr txBox="1"/>
+          <p:nvPr/>
+        </p:nvSpPr>
+        <p:spPr>
+          <a:xfrm>
+            <a:off x="498613" y="1443841"/>
+            <a:ext cx="4743450" cy="3970318"/>
+          </a:xfrm>
+          <a:prstGeom prst="rect">
+            <a:avLst/>
+          </a:prstGeom>
+          <a:noFill/>
+        </p:spPr>
+        <p:txBody>
+          <a:bodyPr wrap="square">
+            <a:spAutoFit/>
+          </a:bodyPr>
+          <a:lstStyle/>
+          <a:p>
+            <a:pPr marL="285750" indent="-285750" algn="just">
+              <a:buClr>
+                <a:schemeClr val="hlink"/>
+              </a:buClr>
+              <a:buSzPts val="3200"/>
+              <a:buFont typeface="Arial" panose="020B0604020202020204" pitchFamily="34" charset="0"/>
+              <a:buChar char="•"/>
+            </a:pPr>
+            <a:r>
+              <a:rPr lang="pt-BR" dirty="0">
+                <a:ea typeface="Times New Roman" panose="02020603050405020304" pitchFamily="18" charset="0"/>
+                <a:cs typeface="Times New Roman" panose="02020603050405020304" pitchFamily="18" charset="0"/>
+              </a:rPr>
+              <a:t>Em comparação com usinas hidrelétricas, são mais rápidas de construir, podendo assim suprir carências de energia de forma rápida;</a:t>
+            </a:r>
+          </a:p>
+          <a:p>
+            <a:pPr marL="285750" indent="-285750" algn="just">
+              <a:buClr>
+                <a:schemeClr val="hlink"/>
+              </a:buClr>
+              <a:buSzPts val="3200"/>
+              <a:buFont typeface="Arial" panose="020B0604020202020204" pitchFamily="34" charset="0"/>
+              <a:buChar char="•"/>
+            </a:pPr>
+            <a:r>
+              <a:rPr lang="pt-BR" sz="1800" dirty="0">
+                <a:effectLst/>
+                <a:ea typeface="Times New Roman" panose="02020603050405020304" pitchFamily="18" charset="0"/>
+                <a:cs typeface="Times New Roman" panose="02020603050405020304" pitchFamily="18" charset="0"/>
+              </a:rPr>
+              <a:t>Podem ser instaladas em locais próximos ás regiões de consumo, reduzindo o custo de torres e linhas de transmissão;</a:t>
+            </a:r>
+          </a:p>
+          <a:p>
+            <a:pPr marL="285750" indent="-285750" algn="just">
+              <a:buClr>
+                <a:schemeClr val="hlink"/>
+              </a:buClr>
+              <a:buSzPts val="3200"/>
+              <a:buFont typeface="Arial" panose="020B0604020202020204" pitchFamily="34" charset="0"/>
+              <a:buChar char="•"/>
+            </a:pPr>
+            <a:r>
+              <a:rPr lang="pt-BR" dirty="0">
+                <a:ea typeface="Times New Roman" panose="02020603050405020304" pitchFamily="18" charset="0"/>
+                <a:cs typeface="Times New Roman" panose="02020603050405020304" pitchFamily="18" charset="0"/>
+              </a:rPr>
+              <a:t>São alternativas para países que não possuem outros tipos de fontes de energia;</a:t>
+            </a:r>
+          </a:p>
+          <a:p>
+            <a:pPr marL="285750" indent="-285750" algn="just">
+              <a:buClr>
+                <a:schemeClr val="hlink"/>
+              </a:buClr>
+              <a:buSzPts val="3200"/>
+              <a:buFont typeface="Arial" panose="020B0604020202020204" pitchFamily="34" charset="0"/>
+              <a:buChar char="•"/>
+            </a:pPr>
+            <a:r>
+              <a:rPr lang="pt-BR" sz="1800" dirty="0">
+                <a:effectLst/>
+                <a:ea typeface="Times New Roman" panose="02020603050405020304" pitchFamily="18" charset="0"/>
+                <a:cs typeface="Times New Roman" panose="02020603050405020304" pitchFamily="18" charset="0"/>
+              </a:rPr>
+              <a:t>Repasse dos custos ao consumidor sem retorno efetivo em qualidade e segurança do fornecimento; </a:t>
+            </a:r>
+          </a:p>
+          <a:p>
+            <a:pPr marL="285750" indent="-285750" algn="just">
+              <a:buClr>
+                <a:schemeClr val="hlink"/>
+              </a:buClr>
+              <a:buSzPts val="3200"/>
+              <a:buFont typeface="Arial" panose="020B0604020202020204" pitchFamily="34" charset="0"/>
+              <a:buChar char="•"/>
+            </a:pPr>
+            <a:r>
+              <a:rPr lang="pt-BR" sz="1800" dirty="0">
+                <a:effectLst/>
+                <a:ea typeface="Times New Roman" panose="02020603050405020304" pitchFamily="18" charset="0"/>
+                <a:cs typeface="Times New Roman" panose="02020603050405020304" pitchFamily="18" charset="0"/>
+              </a:rPr>
+              <a:t>Ambas demonstram falta de planejamento e política sustentável, são pontos negativos das energias atuais.</a:t>
+            </a:r>
+            <a:endParaRPr lang="pt-BR" sz="1800" dirty="0">
+              <a:effectLst/>
+              <a:ea typeface="Calibri" panose="020F0502020204030204" pitchFamily="34" charset="0"/>
+              <a:cs typeface="Times New Roman" panose="02020603050405020304" pitchFamily="18" charset="0"/>
+            </a:endParaRPr>
+          </a:p>
+        </p:txBody>
+      </p:sp>
+      <p:sp>
+        <p:nvSpPr>
+          <p:cNvPr id="11" name="Google Shape;61;p7">
+            <a:extLst>
+              <a:ext uri="{FF2B5EF4-FFF2-40B4-BE49-F238E27FC236}">
+                <a16:creationId xmlns:a16="http://schemas.microsoft.com/office/drawing/2014/main" id="{CB3A47BF-898E-41AD-88E5-D04325420763}"/>
+              </a:ext>
+            </a:extLst>
+          </p:cNvPr>
+          <p:cNvSpPr txBox="1">
+            <a:spLocks/>
+          </p:cNvSpPr>
+          <p:nvPr/>
+        </p:nvSpPr>
+        <p:spPr>
+          <a:xfrm>
+            <a:off x="1245834" y="132524"/>
+            <a:ext cx="10204882" cy="1431925"/>
+          </a:xfrm>
+          <a:prstGeom prst="rect">
+            <a:avLst/>
+          </a:prstGeom>
+          <a:noFill/>
+          <a:ln>
+            <a:noFill/>
+          </a:ln>
+          <a:effectLst/>
+        </p:spPr>
+        <p:txBody>
+          <a:bodyPr spcFirstLastPara="1" vert="horz" wrap="square" lIns="91425" tIns="45700" rIns="91425" bIns="45700" rtlCol="0" anchor="ctr" anchorCtr="0">
+            <a:noAutofit/>
+          </a:bodyPr>
+          <a:lstStyle>
+            <a:lvl1pPr algn="l" defTabSz="457200" rtl="0" eaLnBrk="1" latinLnBrk="0" hangingPunct="1">
+              <a:spcBef>
+                <a:spcPct val="0"/>
+              </a:spcBef>
+              <a:buNone/>
+              <a:defRPr sz="4800" kern="1200" cap="all">
+                <a:ln w="3175" cmpd="sng">
+                  <a:noFill/>
+                </a:ln>
+                <a:solidFill>
+                  <a:schemeClr val="tx1"/>
+                </a:solidFill>
+                <a:effectLst/>
+                <a:latin typeface="+mj-lt"/>
+                <a:ea typeface="+mj-ea"/>
+                <a:cs typeface="+mj-cs"/>
+              </a:defRPr>
+            </a:lvl1pPr>
+            <a:lvl2pPr eaLnBrk="1" hangingPunct="1">
+              <a:defRPr>
+                <a:solidFill>
+                  <a:schemeClr val="tx2"/>
+                </a:solidFill>
+              </a:defRPr>
+            </a:lvl2pPr>
+            <a:lvl3pPr eaLnBrk="1" hangingPunct="1">
+              <a:defRPr>
+                <a:solidFill>
+                  <a:schemeClr val="tx2"/>
+                </a:solidFill>
+              </a:defRPr>
+            </a:lvl3pPr>
+            <a:lvl4pPr eaLnBrk="1" hangingPunct="1">
+              <a:defRPr>
+                <a:solidFill>
+                  <a:schemeClr val="tx2"/>
+                </a:solidFill>
+              </a:defRPr>
+            </a:lvl4pPr>
+            <a:lvl5pPr eaLnBrk="1" hangingPunct="1">
+              <a:defRPr>
+                <a:solidFill>
+                  <a:schemeClr val="tx2"/>
+                </a:solidFill>
+              </a:defRPr>
+            </a:lvl5pPr>
+            <a:lvl6pPr eaLnBrk="1" hangingPunct="1">
+              <a:defRPr>
+                <a:solidFill>
+                  <a:schemeClr val="tx2"/>
+                </a:solidFill>
+              </a:defRPr>
+            </a:lvl6pPr>
+            <a:lvl7pPr eaLnBrk="1" hangingPunct="1">
+              <a:defRPr>
+                <a:solidFill>
+                  <a:schemeClr val="tx2"/>
+                </a:solidFill>
+              </a:defRPr>
+            </a:lvl7pPr>
+            <a:lvl8pPr eaLnBrk="1" hangingPunct="1">
+              <a:defRPr>
+                <a:solidFill>
+                  <a:schemeClr val="tx2"/>
+                </a:solidFill>
+              </a:defRPr>
+            </a:lvl8pPr>
+            <a:lvl9pPr eaLnBrk="1" hangingPunct="1">
+              <a:defRPr>
+                <a:solidFill>
+                  <a:schemeClr val="tx2"/>
+                </a:solidFill>
+              </a:defRPr>
+            </a:lvl9pPr>
+          </a:lstStyle>
+          <a:p>
+            <a:pPr algn="ctr">
+              <a:spcBef>
+                <a:spcPts val="0"/>
+              </a:spcBef>
+              <a:buClr>
+                <a:schemeClr val="dk2"/>
+              </a:buClr>
+              <a:buSzPts val="4400"/>
+              <a:buFont typeface="Arial Black"/>
+              <a:buNone/>
+            </a:pPr>
+            <a:r>
+              <a:rPr lang="en-US" sz="4000" dirty="0">
+                <a:latin typeface="Arial Black" panose="020B0A04020102020204" pitchFamily="34" charset="0"/>
+              </a:rPr>
+              <a:t>O QUE TEMOS HOJE?</a:t>
+            </a:r>
+          </a:p>
+          <a:p>
+            <a:pPr algn="ctr">
+              <a:spcBef>
+                <a:spcPts val="0"/>
+              </a:spcBef>
+              <a:buClr>
+                <a:schemeClr val="dk2"/>
+              </a:buClr>
+              <a:buSzPts val="4400"/>
+              <a:buFont typeface="Arial Black"/>
+              <a:buNone/>
+            </a:pPr>
+            <a:r>
+              <a:rPr lang="en-US" sz="4000" dirty="0">
+                <a:latin typeface="Arial Black" panose="020B0A04020102020204" pitchFamily="34" charset="0"/>
+              </a:rPr>
+              <a:t>TERMELETRICAS</a:t>
+            </a:r>
+          </a:p>
+        </p:txBody>
+      </p:sp>
       <p:pic>
         <p:nvPicPr>
-          <p:cNvPr id="6" name="Imagem 5">
-            <a:extLst>
-              <a:ext uri="{FF2B5EF4-FFF2-40B4-BE49-F238E27FC236}">
-                <a16:creationId xmlns:a16="http://schemas.microsoft.com/office/drawing/2014/main" id="{A28EF605-1F9B-48D2-96DE-355D90EFBD3D}"/>
+          <p:cNvPr id="12" name="Imagem 11">
+            <a:extLst>
+              <a:ext uri="{FF2B5EF4-FFF2-40B4-BE49-F238E27FC236}">
+                <a16:creationId xmlns:a16="http://schemas.microsoft.com/office/drawing/2014/main" id="{A2467DB7-38A5-4B00-8BA2-66171634E520}"/>
               </a:ext>
             </a:extLst>
           </p:cNvPr>
@@ -6373,256 +7031,8 @@
         </p:blipFill>
         <p:spPr>
           <a:xfrm>
-            <a:off x="7068289" y="1367810"/>
-            <a:ext cx="4285511" cy="2411440"/>
-          </a:xfrm>
-          <a:prstGeom prst="rect">
-            <a:avLst/>
-          </a:prstGeom>
-        </p:spPr>
-      </p:pic>
-      <p:sp>
-        <p:nvSpPr>
-          <p:cNvPr id="10" name="CaixaDeTexto 9">
-            <a:extLst>
-              <a:ext uri="{FF2B5EF4-FFF2-40B4-BE49-F238E27FC236}">
-                <a16:creationId xmlns:a16="http://schemas.microsoft.com/office/drawing/2014/main" id="{EF4D8725-EFF2-4DDF-81D3-43F8A3B997A1}"/>
-              </a:ext>
-            </a:extLst>
-          </p:cNvPr>
-          <p:cNvSpPr txBox="1"/>
-          <p:nvPr/>
-        </p:nvSpPr>
-        <p:spPr>
-          <a:xfrm>
-            <a:off x="440635" y="2310376"/>
-            <a:ext cx="4743450" cy="1754326"/>
-          </a:xfrm>
-          <a:prstGeom prst="rect">
-            <a:avLst/>
-          </a:prstGeom>
-          <a:noFill/>
-        </p:spPr>
-        <p:txBody>
-          <a:bodyPr wrap="square">
-            <a:spAutoFit/>
-          </a:bodyPr>
-          <a:lstStyle/>
-          <a:p>
-            <a:pPr marL="285750" indent="-285750" algn="just">
-              <a:buClr>
-                <a:schemeClr val="hlink"/>
-              </a:buClr>
-              <a:buSzPts val="3200"/>
-              <a:buFont typeface="Arial" panose="020B0604020202020204" pitchFamily="34" charset="0"/>
-              <a:buChar char="•"/>
-            </a:pPr>
-            <a:r>
-              <a:rPr lang="pt-BR" sz="1800" dirty="0">
-                <a:effectLst/>
-                <a:ea typeface="Times New Roman" panose="02020603050405020304" pitchFamily="18" charset="0"/>
-                <a:cs typeface="Times New Roman" panose="02020603050405020304" pitchFamily="18" charset="0"/>
-              </a:rPr>
-              <a:t>Repasse dos custos ao consumidor sem retorno efetivo em qualidade e segurança do fornecimento; </a:t>
-            </a:r>
-          </a:p>
-          <a:p>
-            <a:pPr marL="285750" indent="-285750" algn="just">
-              <a:buClr>
-                <a:schemeClr val="hlink"/>
-              </a:buClr>
-              <a:buSzPts val="3200"/>
-              <a:buFont typeface="Arial" panose="020B0604020202020204" pitchFamily="34" charset="0"/>
-              <a:buChar char="•"/>
-            </a:pPr>
-            <a:r>
-              <a:rPr lang="pt-BR" sz="1800" dirty="0">
-                <a:effectLst/>
-                <a:ea typeface="Times New Roman" panose="02020603050405020304" pitchFamily="18" charset="0"/>
-                <a:cs typeface="Times New Roman" panose="02020603050405020304" pitchFamily="18" charset="0"/>
-              </a:rPr>
-              <a:t>Ambas demonstram falta de planejamento e política sustentável, são pontos negativos das energias atuais.</a:t>
-            </a:r>
-            <a:endParaRPr lang="pt-BR" sz="1800" dirty="0">
-              <a:effectLst/>
-              <a:ea typeface="Calibri" panose="020F0502020204030204" pitchFamily="34" charset="0"/>
-              <a:cs typeface="Times New Roman" panose="02020603050405020304" pitchFamily="18" charset="0"/>
-            </a:endParaRPr>
-          </a:p>
-        </p:txBody>
-      </p:sp>
-      <p:sp>
-        <p:nvSpPr>
-          <p:cNvPr id="11" name="Google Shape;61;p7">
-            <a:extLst>
-              <a:ext uri="{FF2B5EF4-FFF2-40B4-BE49-F238E27FC236}">
-                <a16:creationId xmlns:a16="http://schemas.microsoft.com/office/drawing/2014/main" id="{CB3A47BF-898E-41AD-88E5-D04325420763}"/>
-              </a:ext>
-            </a:extLst>
-          </p:cNvPr>
-          <p:cNvSpPr txBox="1">
-            <a:spLocks/>
-          </p:cNvSpPr>
-          <p:nvPr/>
-        </p:nvSpPr>
-        <p:spPr>
-          <a:xfrm>
-            <a:off x="1245834" y="304800"/>
-            <a:ext cx="10204882" cy="1431925"/>
-          </a:xfrm>
-          <a:prstGeom prst="rect">
-            <a:avLst/>
-          </a:prstGeom>
-          <a:noFill/>
-          <a:ln>
-            <a:noFill/>
-          </a:ln>
-          <a:effectLst/>
-        </p:spPr>
-        <p:txBody>
-          <a:bodyPr spcFirstLastPara="1" vert="horz" wrap="square" lIns="91425" tIns="45700" rIns="91425" bIns="45700" rtlCol="0" anchor="ctr" anchorCtr="0">
-            <a:noAutofit/>
-          </a:bodyPr>
-          <a:lstStyle>
-            <a:lvl1pPr algn="l" defTabSz="457200" rtl="0" eaLnBrk="1" latinLnBrk="0" hangingPunct="1">
-              <a:spcBef>
-                <a:spcPct val="0"/>
-              </a:spcBef>
-              <a:buNone/>
-              <a:defRPr sz="4800" kern="1200" cap="all">
-                <a:ln w="3175" cmpd="sng">
-                  <a:noFill/>
-                </a:ln>
-                <a:solidFill>
-                  <a:schemeClr val="tx1"/>
-                </a:solidFill>
-                <a:effectLst/>
-                <a:latin typeface="+mj-lt"/>
-                <a:ea typeface="+mj-ea"/>
-                <a:cs typeface="+mj-cs"/>
-              </a:defRPr>
-            </a:lvl1pPr>
-            <a:lvl2pPr eaLnBrk="1" hangingPunct="1">
-              <a:defRPr>
-                <a:solidFill>
-                  <a:schemeClr val="tx2"/>
-                </a:solidFill>
-              </a:defRPr>
-            </a:lvl2pPr>
-            <a:lvl3pPr eaLnBrk="1" hangingPunct="1">
-              <a:defRPr>
-                <a:solidFill>
-                  <a:schemeClr val="tx2"/>
-                </a:solidFill>
-              </a:defRPr>
-            </a:lvl3pPr>
-            <a:lvl4pPr eaLnBrk="1" hangingPunct="1">
-              <a:defRPr>
-                <a:solidFill>
-                  <a:schemeClr val="tx2"/>
-                </a:solidFill>
-              </a:defRPr>
-            </a:lvl4pPr>
-            <a:lvl5pPr eaLnBrk="1" hangingPunct="1">
-              <a:defRPr>
-                <a:solidFill>
-                  <a:schemeClr val="tx2"/>
-                </a:solidFill>
-              </a:defRPr>
-            </a:lvl5pPr>
-            <a:lvl6pPr eaLnBrk="1" hangingPunct="1">
-              <a:defRPr>
-                <a:solidFill>
-                  <a:schemeClr val="tx2"/>
-                </a:solidFill>
-              </a:defRPr>
-            </a:lvl6pPr>
-            <a:lvl7pPr eaLnBrk="1" hangingPunct="1">
-              <a:defRPr>
-                <a:solidFill>
-                  <a:schemeClr val="tx2"/>
-                </a:solidFill>
-              </a:defRPr>
-            </a:lvl7pPr>
-            <a:lvl8pPr eaLnBrk="1" hangingPunct="1">
-              <a:defRPr>
-                <a:solidFill>
-                  <a:schemeClr val="tx2"/>
-                </a:solidFill>
-              </a:defRPr>
-            </a:lvl8pPr>
-            <a:lvl9pPr eaLnBrk="1" hangingPunct="1">
-              <a:defRPr>
-                <a:solidFill>
-                  <a:schemeClr val="tx2"/>
-                </a:solidFill>
-              </a:defRPr>
-            </a:lvl9pPr>
-          </a:lstStyle>
-          <a:p>
-            <a:pPr algn="ctr">
-              <a:spcBef>
-                <a:spcPts val="0"/>
-              </a:spcBef>
-              <a:buClr>
-                <a:schemeClr val="dk2"/>
-              </a:buClr>
-              <a:buSzPts val="4400"/>
-              <a:buFont typeface="Arial Black"/>
-              <a:buNone/>
-            </a:pPr>
-            <a:r>
-              <a:rPr lang="en-US" sz="4400" dirty="0">
-                <a:latin typeface="Arial Black" panose="020B0A04020102020204" pitchFamily="34" charset="0"/>
-              </a:rPr>
-              <a:t>O QUE TEMOS HOJE?</a:t>
-            </a:r>
-          </a:p>
-          <a:p>
-            <a:pPr algn="ctr">
-              <a:spcBef>
-                <a:spcPts val="0"/>
-              </a:spcBef>
-              <a:buClr>
-                <a:schemeClr val="dk2"/>
-              </a:buClr>
-              <a:buSzPts val="4400"/>
-              <a:buFont typeface="Arial Black"/>
-              <a:buNone/>
-            </a:pPr>
-            <a:r>
-              <a:rPr lang="en-US" sz="4400" dirty="0">
-                <a:latin typeface="Arial Black" panose="020B0A04020102020204" pitchFamily="34" charset="0"/>
-              </a:rPr>
-              <a:t>TERMELETRICAS</a:t>
-            </a:r>
-          </a:p>
-        </p:txBody>
-      </p:sp>
-      <p:pic>
-        <p:nvPicPr>
-          <p:cNvPr id="12" name="Imagem 11">
-            <a:extLst>
-              <a:ext uri="{FF2B5EF4-FFF2-40B4-BE49-F238E27FC236}">
-                <a16:creationId xmlns:a16="http://schemas.microsoft.com/office/drawing/2014/main" id="{A2467DB7-38A5-4B00-8BA2-66171634E520}"/>
-              </a:ext>
-            </a:extLst>
-          </p:cNvPr>
-          <p:cNvPicPr>
-            <a:picLocks noChangeAspect="1"/>
-          </p:cNvPicPr>
-          <p:nvPr/>
-        </p:nvPicPr>
-        <p:blipFill>
-          <a:blip r:embed="rId3"/>
-          <a:stretch>
-            <a:fillRect/>
-          </a:stretch>
-        </p:blipFill>
-        <p:spPr>
-          <a:xfrm>
-            <a:off x="7068289" y="3915556"/>
-            <a:ext cx="4285512" cy="2411440"/>
+            <a:off x="5658672" y="1629406"/>
+            <a:ext cx="6098344" cy="3431513"/>
           </a:xfrm>
           <a:prstGeom prst="rect">
             <a:avLst/>
@@ -6988,11 +7398,14 @@
               <a:buNone/>
             </a:pPr>
             <a:r>
-              <a:rPr lang="en-US" sz="4400" dirty="0">
+              <a:rPr lang="en-US" sz="4000" dirty="0">
                 <a:latin typeface="Arial Black" panose="020B0A04020102020204" pitchFamily="34" charset="0"/>
               </a:rPr>
-              <a:t>EOLICAS</a:t>
-            </a:r>
+              <a:t>EÓLICAS</a:t>
+            </a:r>
+            <a:endParaRPr lang="en-US" sz="4400" dirty="0">
+              <a:latin typeface="Arial Black" panose="020B0A04020102020204" pitchFamily="34" charset="0"/>
+            </a:endParaRPr>
           </a:p>
         </p:txBody>
       </p:sp>
@@ -7255,10 +7668,10 @@
                 <a:effectLst/>
                 <a:latin typeface="Arial" panose="020B0604020202020204" pitchFamily="34" charset="0"/>
               </a:rPr>
-              <a:t> pode chegar a 18 </a:t>
-            </a:r>
-            <a:r>
-              <a:rPr kumimoji="0" lang="pt-BR" altLang="pt-BR" sz="1600" b="0" i="0" u="none" strike="noStrike" cap="none" normalizeH="0" baseline="0" dirty="0" err="1">
+              <a:t> pode chegar a </a:t>
+            </a:r>
+            <a:r>
+              <a:rPr kumimoji="0" lang="pt-BR" altLang="pt-BR" sz="1600" b="1" i="0" u="none" strike="noStrike" cap="none" normalizeH="0" baseline="0" dirty="0">
                 <a:ln>
                   <a:noFill/>
                 </a:ln>
@@ -7268,7 +7681,33 @@
                 <a:effectLst/>
                 <a:latin typeface="Arial" panose="020B0604020202020204" pitchFamily="34" charset="0"/>
               </a:rPr>
+              <a:t>18 </a:t>
+            </a:r>
+            <a:r>
+              <a:rPr kumimoji="0" lang="pt-BR" altLang="pt-BR" sz="1600" b="1" i="0" u="none" strike="noStrike" cap="none" normalizeH="0" baseline="0" dirty="0" err="1">
+                <a:ln>
+                  <a:noFill/>
+                </a:ln>
+                <a:solidFill>
+                  <a:srgbClr val="262626"/>
+                </a:solidFill>
+                <a:effectLst/>
+                <a:latin typeface="Arial" panose="020B0604020202020204" pitchFamily="34" charset="0"/>
+              </a:rPr>
               <a:t>TWh</a:t>
+            </a:r>
+            <a:r>
+              <a:rPr kumimoji="0" lang="pt-BR" altLang="pt-BR" sz="1600" b="1" i="0" u="none" strike="noStrike" cap="none" normalizeH="0" baseline="0" dirty="0">
+                <a:ln>
+                  <a:noFill/>
+                </a:ln>
+                <a:solidFill>
+                  <a:srgbClr val="262626"/>
+                </a:solidFill>
+                <a:effectLst/>
+                <a:latin typeface="Arial" panose="020B0604020202020204" pitchFamily="34" charset="0"/>
+              </a:rPr>
+              <a:t> </a:t>
             </a:r>
             <a:r>
               <a:rPr kumimoji="0" lang="pt-BR" altLang="pt-BR" sz="1600" b="0" i="0" u="none" strike="noStrike" cap="none" normalizeH="0" baseline="0" dirty="0">
@@ -7281,7 +7720,7 @@
                 <a:effectLst/>
                 <a:latin typeface="Arial" panose="020B0604020202020204" pitchFamily="34" charset="0"/>
               </a:rPr>
-              <a:t> em 2021 – um crescimento de 67% em relação aos 10,7 TWH de 2020.</a:t>
+              <a:t>em 2021 – um crescimento de 67% em relação aos 10,7 TWH de 2020.</a:t>
             </a:r>
             <a:endParaRPr kumimoji="0" lang="pt-BR" altLang="pt-BR" sz="1100" b="0" i="0" u="none" strike="noStrike" cap="none" normalizeH="0" baseline="0" dirty="0">
               <a:ln>
@@ -7322,10 +7761,10 @@
                 <a:effectLst/>
                 <a:latin typeface="Arial" panose="020B0604020202020204" pitchFamily="34" charset="0"/>
               </a:rPr>
-              <a:t>Desse total, a geração solar distribuída terá o maior crescimento, em torno de 125%, gerando 10,8 </a:t>
-            </a:r>
-            <a:r>
-              <a:rPr kumimoji="0" lang="pt-BR" altLang="pt-BR" sz="1600" b="0" i="0" u="none" strike="noStrike" cap="none" normalizeH="0" baseline="0" dirty="0" err="1">
+              <a:t>Desse total, a geração solar distribuída terá o maior crescimento, em torno de 125%, gerando </a:t>
+            </a:r>
+            <a:r>
+              <a:rPr kumimoji="0" lang="pt-BR" altLang="pt-BR" sz="1600" b="1" i="0" u="none" strike="noStrike" cap="none" normalizeH="0" baseline="0" dirty="0">
                 <a:ln>
                   <a:noFill/>
                 </a:ln>
@@ -7335,7 +7774,33 @@
                 <a:effectLst/>
                 <a:latin typeface="Arial" panose="020B0604020202020204" pitchFamily="34" charset="0"/>
               </a:rPr>
+              <a:t>10,8 </a:t>
+            </a:r>
+            <a:r>
+              <a:rPr kumimoji="0" lang="pt-BR" altLang="pt-BR" sz="1600" b="1" i="0" u="none" strike="noStrike" cap="none" normalizeH="0" baseline="0" dirty="0" err="1">
+                <a:ln>
+                  <a:noFill/>
+                </a:ln>
+                <a:solidFill>
+                  <a:srgbClr val="262626"/>
+                </a:solidFill>
+                <a:effectLst/>
+                <a:latin typeface="Arial" panose="020B0604020202020204" pitchFamily="34" charset="0"/>
+              </a:rPr>
               <a:t>TWh</a:t>
+            </a:r>
+            <a:r>
+              <a:rPr kumimoji="0" lang="pt-BR" altLang="pt-BR" sz="1600" b="1" i="0" u="none" strike="noStrike" cap="none" normalizeH="0" baseline="0" dirty="0">
+                <a:ln>
+                  <a:noFill/>
+                </a:ln>
+                <a:solidFill>
+                  <a:srgbClr val="262626"/>
+                </a:solidFill>
+                <a:effectLst/>
+                <a:latin typeface="Arial" panose="020B0604020202020204" pitchFamily="34" charset="0"/>
+              </a:rPr>
+              <a:t> </a:t>
             </a:r>
             <a:r>
               <a:rPr kumimoji="0" lang="pt-BR" altLang="pt-BR" sz="1600" b="0" i="0" u="none" strike="noStrike" cap="none" normalizeH="0" baseline="0" dirty="0">
@@ -7348,7 +7813,7 @@
                 <a:effectLst/>
                 <a:latin typeface="Arial" panose="020B0604020202020204" pitchFamily="34" charset="0"/>
               </a:rPr>
-              <a:t> em 2021 ante 4,8 </a:t>
+              <a:t>em 2021 ante 4,8 </a:t>
             </a:r>
             <a:r>
               <a:rPr kumimoji="0" lang="pt-BR" altLang="pt-BR" sz="1600" b="0" i="0" u="none" strike="noStrike" cap="none" normalizeH="0" baseline="0" dirty="0" err="1">

</xml_diff>